<commit_message>
IntuitiveCommandPrompt: update Model Class Diagram in developer guide
</commit_message>
<xml_diff>
--- a/docs/diagrams/ModelComponentClassDiagram.pptx
+++ b/docs/diagrams/ModelComponentClassDiagram.pptx
@@ -5,10 +5,11 @@
     <p:sldMasterId id="2147483648" r:id="rId1"/>
   </p:sldMasterIdLst>
   <p:notesMasterIdLst>
-    <p:notesMasterId r:id="rId3"/>
+    <p:notesMasterId r:id="rId4"/>
   </p:notesMasterIdLst>
   <p:sldIdLst>
     <p:sldId id="263" r:id="rId2"/>
+    <p:sldId id="264" r:id="rId3"/>
   </p:sldIdLst>
   <p:sldSz cx="9144000" cy="6858000" type="screen4x3"/>
   <p:notesSz cx="6858000" cy="9144000"/>
@@ -208,7 +209,7 @@
           <a:p>
             <a:fld id="{F5CC4B3F-88C1-4FFA-B1B6-F41C21DC6924}" type="datetimeFigureOut">
               <a:rPr lang="en-US" smtClean="0"/>
-              <a:t>6/27/2018</a:t>
+              <a:t>10/29/2018</a:t>
             </a:fld>
             <a:endParaRPr lang="en-US"/>
           </a:p>
@@ -654,7 +655,7 @@
           <a:p>
             <a:fld id="{78C97017-6FC3-485B-9764-EAC9E56C1D49}" type="datetimeFigureOut">
               <a:rPr lang="en-US" smtClean="0"/>
-              <a:t>6/27/2018</a:t>
+              <a:t>10/29/2018</a:t>
             </a:fld>
             <a:endParaRPr lang="en-US"/>
           </a:p>
@@ -822,7 +823,7 @@
           <a:p>
             <a:fld id="{78C97017-6FC3-485B-9764-EAC9E56C1D49}" type="datetimeFigureOut">
               <a:rPr lang="en-US" smtClean="0"/>
-              <a:t>6/27/2018</a:t>
+              <a:t>10/29/2018</a:t>
             </a:fld>
             <a:endParaRPr lang="en-US"/>
           </a:p>
@@ -1000,7 +1001,7 @@
           <a:p>
             <a:fld id="{78C97017-6FC3-485B-9764-EAC9E56C1D49}" type="datetimeFigureOut">
               <a:rPr lang="en-US" smtClean="0"/>
-              <a:t>6/27/2018</a:t>
+              <a:t>10/29/2018</a:t>
             </a:fld>
             <a:endParaRPr lang="en-US"/>
           </a:p>
@@ -1168,7 +1169,7 @@
           <a:p>
             <a:fld id="{78C97017-6FC3-485B-9764-EAC9E56C1D49}" type="datetimeFigureOut">
               <a:rPr lang="en-US" smtClean="0"/>
-              <a:t>6/27/2018</a:t>
+              <a:t>10/29/2018</a:t>
             </a:fld>
             <a:endParaRPr lang="en-US"/>
           </a:p>
@@ -1413,7 +1414,7 @@
           <a:p>
             <a:fld id="{78C97017-6FC3-485B-9764-EAC9E56C1D49}" type="datetimeFigureOut">
               <a:rPr lang="en-US" smtClean="0"/>
-              <a:t>6/27/2018</a:t>
+              <a:t>10/29/2018</a:t>
             </a:fld>
             <a:endParaRPr lang="en-US"/>
           </a:p>
@@ -1698,7 +1699,7 @@
           <a:p>
             <a:fld id="{78C97017-6FC3-485B-9764-EAC9E56C1D49}" type="datetimeFigureOut">
               <a:rPr lang="en-US" smtClean="0"/>
-              <a:t>6/27/2018</a:t>
+              <a:t>10/29/2018</a:t>
             </a:fld>
             <a:endParaRPr lang="en-US"/>
           </a:p>
@@ -2117,7 +2118,7 @@
           <a:p>
             <a:fld id="{78C97017-6FC3-485B-9764-EAC9E56C1D49}" type="datetimeFigureOut">
               <a:rPr lang="en-US" smtClean="0"/>
-              <a:t>6/27/2018</a:t>
+              <a:t>10/29/2018</a:t>
             </a:fld>
             <a:endParaRPr lang="en-US"/>
           </a:p>
@@ -2234,7 +2235,7 @@
           <a:p>
             <a:fld id="{78C97017-6FC3-485B-9764-EAC9E56C1D49}" type="datetimeFigureOut">
               <a:rPr lang="en-US" smtClean="0"/>
-              <a:t>6/27/2018</a:t>
+              <a:t>10/29/2018</a:t>
             </a:fld>
             <a:endParaRPr lang="en-US"/>
           </a:p>
@@ -2329,7 +2330,7 @@
           <a:p>
             <a:fld id="{78C97017-6FC3-485B-9764-EAC9E56C1D49}" type="datetimeFigureOut">
               <a:rPr lang="en-US" smtClean="0"/>
-              <a:t>6/27/2018</a:t>
+              <a:t>10/29/2018</a:t>
             </a:fld>
             <a:endParaRPr lang="en-US"/>
           </a:p>
@@ -2604,7 +2605,7 @@
           <a:p>
             <a:fld id="{78C97017-6FC3-485B-9764-EAC9E56C1D49}" type="datetimeFigureOut">
               <a:rPr lang="en-US" smtClean="0"/>
-              <a:t>6/27/2018</a:t>
+              <a:t>10/29/2018</a:t>
             </a:fld>
             <a:endParaRPr lang="en-US"/>
           </a:p>
@@ -2856,7 +2857,7 @@
           <a:p>
             <a:fld id="{78C97017-6FC3-485B-9764-EAC9E56C1D49}" type="datetimeFigureOut">
               <a:rPr lang="en-US" smtClean="0"/>
-              <a:t>6/27/2018</a:t>
+              <a:t>10/29/2018</a:t>
             </a:fld>
             <a:endParaRPr lang="en-US"/>
           </a:p>
@@ -3067,7 +3068,7 @@
           <a:p>
             <a:fld id="{78C97017-6FC3-485B-9764-EAC9E56C1D49}" type="datetimeFigureOut">
               <a:rPr lang="en-US" smtClean="0"/>
-              <a:t>6/27/2018</a:t>
+              <a:t>10/29/2018</a:t>
             </a:fld>
             <a:endParaRPr lang="en-US"/>
           </a:p>
@@ -3994,7 +3995,7 @@
           <a:p>
             <a:pPr algn="ctr"/>
             <a:r>
-              <a:rPr lang="en-US" sz="1050" dirty="0" err="1" smtClean="0">
+              <a:rPr lang="en-US" sz="1050" dirty="0" err="1">
                 <a:solidFill>
                   <a:srgbClr val="7030A0"/>
                 </a:solidFill>
@@ -5023,14 +5024,6 @@
               </a:rPr>
               <a:t>&lt;&lt;interface&gt;&gt;</a:t>
             </a:r>
-            <a:r>
-              <a:rPr lang="en-US" sz="1050">
-                <a:solidFill>
-                  <a:srgbClr val="7030A0"/>
-                </a:solidFill>
-              </a:rPr>
-              <a:t/>
-            </a:r>
             <a:br>
               <a:rPr lang="en-US" sz="1050">
                 <a:solidFill>
@@ -5645,6 +5638,2799 @@
     <p:extLst>
       <p:ext uri="{BB962C8B-B14F-4D97-AF65-F5344CB8AC3E}">
         <p14:creationId xmlns:p14="http://schemas.microsoft.com/office/powerpoint/2010/main" val="2396968029"/>
+      </p:ext>
+    </p:extLst>
+  </p:cSld>
+  <p:clrMapOvr>
+    <a:masterClrMapping/>
+  </p:clrMapOvr>
+</p:sld>
+</file>
+
+<file path=ppt/slides/slide2.xml><?xml version="1.0" encoding="utf-8"?>
+<p:sld xmlns:a="http://schemas.openxmlformats.org/drawingml/2006/main" xmlns:r="http://schemas.openxmlformats.org/officeDocument/2006/relationships" xmlns:p="http://schemas.openxmlformats.org/presentationml/2006/main">
+  <p:cSld>
+    <p:spTree>
+      <p:nvGrpSpPr>
+        <p:cNvPr id="1" name=""/>
+        <p:cNvGrpSpPr/>
+        <p:nvPr/>
+      </p:nvGrpSpPr>
+      <p:grpSpPr>
+        <a:xfrm>
+          <a:off x="0" y="0"/>
+          <a:ext cx="0" cy="0"/>
+          <a:chOff x="0" y="0"/>
+          <a:chExt cx="0" cy="0"/>
+        </a:xfrm>
+      </p:grpSpPr>
+      <p:sp>
+        <p:nvSpPr>
+          <p:cNvPr id="118" name="Rectangle 65"/>
+          <p:cNvSpPr/>
+          <p:nvPr/>
+        </p:nvSpPr>
+        <p:spPr>
+          <a:xfrm>
+            <a:off x="1119865" y="1600200"/>
+            <a:ext cx="7490735" cy="3804280"/>
+          </a:xfrm>
+          <a:prstGeom prst="roundRect">
+            <a:avLst>
+              <a:gd name="adj" fmla="val 3484"/>
+            </a:avLst>
+          </a:prstGeom>
+          <a:solidFill>
+            <a:schemeClr val="accent4">
+              <a:lumMod val="20000"/>
+              <a:lumOff val="80000"/>
+            </a:schemeClr>
+          </a:solidFill>
+          <a:ln w="19050">
+            <a:noFill/>
+          </a:ln>
+          <a:effectLst/>
+        </p:spPr>
+        <p:style>
+          <a:lnRef idx="1">
+            <a:schemeClr val="accent2"/>
+          </a:lnRef>
+          <a:fillRef idx="2">
+            <a:schemeClr val="accent2"/>
+          </a:fillRef>
+          <a:effectRef idx="1">
+            <a:schemeClr val="accent2"/>
+          </a:effectRef>
+          <a:fontRef idx="minor">
+            <a:schemeClr val="dk1"/>
+          </a:fontRef>
+        </p:style>
+        <p:txBody>
+          <a:bodyPr rtlCol="0" anchor="t"/>
+          <a:lstStyle/>
+          <a:p>
+            <a:r>
+              <a:rPr lang="en-US" sz="1200" b="1" dirty="0">
+                <a:solidFill>
+                  <a:srgbClr val="7030A0"/>
+                </a:solidFill>
+              </a:rPr>
+              <a:t>Model</a:t>
+            </a:r>
+            <a:endParaRPr lang="en-SG" sz="1200" b="1" dirty="0">
+              <a:solidFill>
+                <a:srgbClr val="7030A0"/>
+              </a:solidFill>
+            </a:endParaRPr>
+          </a:p>
+        </p:txBody>
+      </p:sp>
+      <p:sp>
+        <p:nvSpPr>
+          <p:cNvPr id="2" name="Rectangle 8"/>
+          <p:cNvSpPr/>
+          <p:nvPr/>
+        </p:nvSpPr>
+        <p:spPr>
+          <a:xfrm>
+            <a:off x="2877180" y="3463240"/>
+            <a:ext cx="1093635" cy="346760"/>
+          </a:xfrm>
+          <a:prstGeom prst="rect">
+            <a:avLst/>
+          </a:prstGeom>
+          <a:solidFill>
+            <a:srgbClr val="7030A0"/>
+          </a:solidFill>
+          <a:ln w="19050">
+            <a:solidFill>
+              <a:srgbClr val="7030A0"/>
+            </a:solidFill>
+          </a:ln>
+          <a:effectLst/>
+        </p:spPr>
+        <p:style>
+          <a:lnRef idx="1">
+            <a:schemeClr val="accent2"/>
+          </a:lnRef>
+          <a:fillRef idx="2">
+            <a:schemeClr val="accent2"/>
+          </a:fillRef>
+          <a:effectRef idx="1">
+            <a:schemeClr val="accent2"/>
+          </a:effectRef>
+          <a:fontRef idx="minor">
+            <a:schemeClr val="dk1"/>
+          </a:fontRef>
+        </p:style>
+        <p:txBody>
+          <a:bodyPr rtlCol="0" anchor="ctr"/>
+          <a:lstStyle/>
+          <a:p>
+            <a:pPr algn="ctr"/>
+            <a:r>
+              <a:rPr lang="en-US" sz="1050" dirty="0" err="1">
+                <a:solidFill>
+                  <a:schemeClr val="bg1"/>
+                </a:solidFill>
+              </a:rPr>
+              <a:t>UserPref</a:t>
+            </a:r>
+            <a:endParaRPr lang="en-SG" sz="1050" dirty="0">
+              <a:solidFill>
+                <a:schemeClr val="bg1"/>
+              </a:solidFill>
+            </a:endParaRPr>
+          </a:p>
+        </p:txBody>
+      </p:sp>
+      <p:sp>
+        <p:nvSpPr>
+          <p:cNvPr id="9" name="Rectangle 62"/>
+          <p:cNvSpPr/>
+          <p:nvPr/>
+        </p:nvSpPr>
+        <p:spPr>
+          <a:xfrm rot="16200000">
+            <a:off x="1661548" y="3097750"/>
+            <a:ext cx="1093635" cy="346760"/>
+          </a:xfrm>
+          <a:prstGeom prst="rect">
+            <a:avLst/>
+          </a:prstGeom>
+          <a:solidFill>
+            <a:srgbClr val="7030A0"/>
+          </a:solidFill>
+          <a:ln w="19050">
+            <a:solidFill>
+              <a:srgbClr val="7030A0"/>
+            </a:solidFill>
+          </a:ln>
+          <a:effectLst/>
+        </p:spPr>
+        <p:style>
+          <a:lnRef idx="1">
+            <a:schemeClr val="accent2"/>
+          </a:lnRef>
+          <a:fillRef idx="2">
+            <a:schemeClr val="accent2"/>
+          </a:fillRef>
+          <a:effectRef idx="1">
+            <a:schemeClr val="accent2"/>
+          </a:effectRef>
+          <a:fontRef idx="minor">
+            <a:schemeClr val="dk1"/>
+          </a:fontRef>
+        </p:style>
+        <p:txBody>
+          <a:bodyPr rtlCol="0" anchor="ctr"/>
+          <a:lstStyle/>
+          <a:p>
+            <a:pPr algn="ctr"/>
+            <a:r>
+              <a:rPr lang="en-US" sz="1050" dirty="0" err="1">
+                <a:solidFill>
+                  <a:schemeClr val="bg1"/>
+                </a:solidFill>
+              </a:rPr>
+              <a:t>ModelManager</a:t>
+            </a:r>
+            <a:endParaRPr lang="en-SG" sz="1050" dirty="0">
+              <a:solidFill>
+                <a:schemeClr val="bg1"/>
+              </a:solidFill>
+            </a:endParaRPr>
+          </a:p>
+        </p:txBody>
+      </p:sp>
+      <p:sp>
+        <p:nvSpPr>
+          <p:cNvPr id="119" name="Rectangle 62"/>
+          <p:cNvSpPr/>
+          <p:nvPr/>
+        </p:nvSpPr>
+        <p:spPr>
+          <a:xfrm rot="16200000">
+            <a:off x="956202" y="2861202"/>
+            <a:ext cx="1093635" cy="346760"/>
+          </a:xfrm>
+          <a:prstGeom prst="rect">
+            <a:avLst/>
+          </a:prstGeom>
+          <a:solidFill>
+            <a:srgbClr val="7030A0"/>
+          </a:solidFill>
+          <a:ln w="19050">
+            <a:solidFill>
+              <a:srgbClr val="7030A0"/>
+            </a:solidFill>
+          </a:ln>
+          <a:effectLst/>
+        </p:spPr>
+        <p:style>
+          <a:lnRef idx="1">
+            <a:schemeClr val="accent2"/>
+          </a:lnRef>
+          <a:fillRef idx="2">
+            <a:schemeClr val="accent2"/>
+          </a:fillRef>
+          <a:effectRef idx="1">
+            <a:schemeClr val="accent2"/>
+          </a:effectRef>
+          <a:fontRef idx="minor">
+            <a:schemeClr val="dk1"/>
+          </a:fontRef>
+        </p:style>
+        <p:txBody>
+          <a:bodyPr rtlCol="0" anchor="ctr"/>
+          <a:lstStyle/>
+          <a:p>
+            <a:pPr algn="ctr"/>
+            <a:r>
+              <a:rPr lang="en-US" sz="1050" dirty="0">
+                <a:solidFill>
+                  <a:schemeClr val="bg1"/>
+                </a:solidFill>
+              </a:rPr>
+              <a:t>&lt;&lt;interface&gt;&gt;</a:t>
+            </a:r>
+          </a:p>
+          <a:p>
+            <a:pPr algn="ctr"/>
+            <a:r>
+              <a:rPr lang="en-US" sz="1050" dirty="0">
+                <a:solidFill>
+                  <a:schemeClr val="bg1"/>
+                </a:solidFill>
+              </a:rPr>
+              <a:t>Model</a:t>
+            </a:r>
+            <a:endParaRPr lang="en-SG" sz="1050" dirty="0">
+              <a:solidFill>
+                <a:schemeClr val="bg1"/>
+              </a:solidFill>
+            </a:endParaRPr>
+          </a:p>
+        </p:txBody>
+      </p:sp>
+      <p:sp>
+        <p:nvSpPr>
+          <p:cNvPr id="120" name="Isosceles Triangle 102"/>
+          <p:cNvSpPr/>
+          <p:nvPr/>
+        </p:nvSpPr>
+        <p:spPr>
+          <a:xfrm rot="16200000">
+            <a:off x="1626910" y="2952291"/>
+            <a:ext cx="270504" cy="175523"/>
+          </a:xfrm>
+          <a:prstGeom prst="triangle">
+            <a:avLst/>
+          </a:prstGeom>
+          <a:solidFill>
+            <a:srgbClr val="7030A0"/>
+          </a:solidFill>
+          <a:ln w="19050">
+            <a:solidFill>
+              <a:srgbClr val="7030A0"/>
+            </a:solidFill>
+          </a:ln>
+          <a:effectLst/>
+        </p:spPr>
+        <p:style>
+          <a:lnRef idx="1">
+            <a:schemeClr val="accent6"/>
+          </a:lnRef>
+          <a:fillRef idx="2">
+            <a:schemeClr val="accent6"/>
+          </a:fillRef>
+          <a:effectRef idx="1">
+            <a:schemeClr val="accent6"/>
+          </a:effectRef>
+          <a:fontRef idx="minor">
+            <a:schemeClr val="dk1"/>
+          </a:fontRef>
+        </p:style>
+        <p:txBody>
+          <a:bodyPr rtlCol="0" anchor="ctr"/>
+          <a:lstStyle/>
+          <a:p>
+            <a:pPr algn="ctr"/>
+            <a:endParaRPr lang="en-SG" sz="1050"/>
+          </a:p>
+        </p:txBody>
+      </p:sp>
+      <p:cxnSp>
+        <p:nvCxnSpPr>
+          <p:cNvPr id="58" name="Straight Arrow Connector 57"/>
+          <p:cNvCxnSpPr>
+            <a:stCxn id="42" idx="3"/>
+            <a:endCxn id="2" idx="1"/>
+          </p:cNvCxnSpPr>
+          <p:nvPr/>
+        </p:nvCxnSpPr>
+        <p:spPr>
+          <a:xfrm>
+            <a:off x="2609828" y="3636620"/>
+            <a:ext cx="267352" cy="0"/>
+          </a:xfrm>
+          <a:prstGeom prst="straightConnector1">
+            <a:avLst/>
+          </a:prstGeom>
+          <a:ln w="19050">
+            <a:solidFill>
+              <a:srgbClr val="7030A0"/>
+            </a:solidFill>
+            <a:headEnd type="none" w="med" len="med"/>
+            <a:tailEnd type="arrow" w="med" len="med"/>
+          </a:ln>
+          <a:effectLst/>
+        </p:spPr>
+        <p:style>
+          <a:lnRef idx="1">
+            <a:schemeClr val="accent2"/>
+          </a:lnRef>
+          <a:fillRef idx="2">
+            <a:schemeClr val="accent2"/>
+          </a:fillRef>
+          <a:effectRef idx="1">
+            <a:schemeClr val="accent2"/>
+          </a:effectRef>
+          <a:fontRef idx="minor">
+            <a:schemeClr val="dk1"/>
+          </a:fontRef>
+        </p:style>
+      </p:cxnSp>
+      <p:cxnSp>
+        <p:nvCxnSpPr>
+          <p:cNvPr id="75" name="Elbow Connector 122"/>
+          <p:cNvCxnSpPr/>
+          <p:nvPr/>
+        </p:nvCxnSpPr>
+        <p:spPr>
+          <a:xfrm>
+            <a:off x="910091" y="3040053"/>
+            <a:ext cx="419548" cy="2860"/>
+          </a:xfrm>
+          <a:prstGeom prst="bentConnector3">
+            <a:avLst>
+              <a:gd name="adj1" fmla="val 50000"/>
+            </a:avLst>
+          </a:prstGeom>
+          <a:ln w="19050">
+            <a:solidFill>
+              <a:schemeClr val="bg1">
+                <a:lumMod val="75000"/>
+              </a:schemeClr>
+            </a:solidFill>
+            <a:prstDash val="sysDot"/>
+            <a:headEnd type="none" w="med" len="med"/>
+            <a:tailEnd type="arrow" w="med" len="med"/>
+          </a:ln>
+          <a:effectLst/>
+        </p:spPr>
+        <p:style>
+          <a:lnRef idx="1">
+            <a:schemeClr val="accent2"/>
+          </a:lnRef>
+          <a:fillRef idx="2">
+            <a:schemeClr val="accent2"/>
+          </a:fillRef>
+          <a:effectRef idx="1">
+            <a:schemeClr val="accent2"/>
+          </a:effectRef>
+          <a:fontRef idx="minor">
+            <a:schemeClr val="dk1"/>
+          </a:fontRef>
+        </p:style>
+      </p:cxnSp>
+      <p:cxnSp>
+        <p:nvCxnSpPr>
+          <p:cNvPr id="21" name="Straight Connector 20"/>
+          <p:cNvCxnSpPr>
+            <a:stCxn id="120" idx="3"/>
+          </p:cNvCxnSpPr>
+          <p:nvPr/>
+        </p:nvCxnSpPr>
+        <p:spPr>
+          <a:xfrm flipV="1">
+            <a:off x="1849924" y="3040052"/>
+            <a:ext cx="216105" cy="1"/>
+          </a:xfrm>
+          <a:prstGeom prst="line">
+            <a:avLst/>
+          </a:prstGeom>
+          <a:ln w="19050">
+            <a:solidFill>
+              <a:srgbClr val="7030A0"/>
+            </a:solidFill>
+            <a:prstDash val="sysDot"/>
+            <a:headEnd type="none" w="med" len="med"/>
+            <a:tailEnd type="none" w="med" len="med"/>
+          </a:ln>
+          <a:effectLst/>
+        </p:spPr>
+        <p:style>
+          <a:lnRef idx="1">
+            <a:schemeClr val="accent2"/>
+          </a:lnRef>
+          <a:fillRef idx="2">
+            <a:schemeClr val="accent2"/>
+          </a:fillRef>
+          <a:effectRef idx="1">
+            <a:schemeClr val="accent2"/>
+          </a:effectRef>
+          <a:fontRef idx="minor">
+            <a:schemeClr val="dk1"/>
+          </a:fontRef>
+        </p:style>
+      </p:cxnSp>
+      <p:sp>
+        <p:nvSpPr>
+          <p:cNvPr id="42" name="Flowchart: Decision 96"/>
+          <p:cNvSpPr/>
+          <p:nvPr/>
+        </p:nvSpPr>
+        <p:spPr>
+          <a:xfrm>
+            <a:off x="2373780" y="3549930"/>
+            <a:ext cx="236048" cy="173380"/>
+          </a:xfrm>
+          <a:prstGeom prst="flowChartDecision">
+            <a:avLst/>
+          </a:prstGeom>
+          <a:noFill/>
+          <a:ln w="19050">
+            <a:solidFill>
+              <a:srgbClr val="7030A0"/>
+            </a:solidFill>
+          </a:ln>
+          <a:effectLst/>
+        </p:spPr>
+        <p:style>
+          <a:lnRef idx="1">
+            <a:schemeClr val="accent6"/>
+          </a:lnRef>
+          <a:fillRef idx="2">
+            <a:schemeClr val="accent6"/>
+          </a:fillRef>
+          <a:effectRef idx="1">
+            <a:schemeClr val="accent6"/>
+          </a:effectRef>
+          <a:fontRef idx="minor">
+            <a:schemeClr val="dk1"/>
+          </a:fontRef>
+        </p:style>
+        <p:txBody>
+          <a:bodyPr rtlCol="0" anchor="ctr"/>
+          <a:lstStyle/>
+          <a:p>
+            <a:pPr algn="ctr"/>
+            <a:endParaRPr lang="en-US" sz="1050"/>
+          </a:p>
+        </p:txBody>
+      </p:sp>
+      <p:sp>
+        <p:nvSpPr>
+          <p:cNvPr id="46" name="Rectangle 8"/>
+          <p:cNvSpPr/>
+          <p:nvPr/>
+        </p:nvSpPr>
+        <p:spPr>
+          <a:xfrm>
+            <a:off x="2825280" y="2846162"/>
+            <a:ext cx="1490560" cy="334856"/>
+          </a:xfrm>
+          <a:prstGeom prst="rect">
+            <a:avLst/>
+          </a:prstGeom>
+          <a:ln w="19050">
+            <a:solidFill>
+              <a:srgbClr val="7030A0"/>
+            </a:solidFill>
+          </a:ln>
+          <a:effectLst/>
+        </p:spPr>
+        <p:style>
+          <a:lnRef idx="1">
+            <a:schemeClr val="accent4"/>
+          </a:lnRef>
+          <a:fillRef idx="2">
+            <a:schemeClr val="accent4"/>
+          </a:fillRef>
+          <a:effectRef idx="1">
+            <a:schemeClr val="accent4"/>
+          </a:effectRef>
+          <a:fontRef idx="minor">
+            <a:schemeClr val="dk1"/>
+          </a:fontRef>
+        </p:style>
+        <p:txBody>
+          <a:bodyPr rtlCol="0" anchor="ctr"/>
+          <a:lstStyle/>
+          <a:p>
+            <a:pPr algn="ctr"/>
+            <a:r>
+              <a:rPr lang="en-US" sz="1050" dirty="0" err="1">
+                <a:solidFill>
+                  <a:srgbClr val="7030A0"/>
+                </a:solidFill>
+              </a:rPr>
+              <a:t>VersionedAddressBook</a:t>
+            </a:r>
+            <a:endParaRPr lang="en-SG" sz="1050" dirty="0">
+              <a:solidFill>
+                <a:srgbClr val="7030A0"/>
+              </a:solidFill>
+            </a:endParaRPr>
+          </a:p>
+        </p:txBody>
+      </p:sp>
+      <p:cxnSp>
+        <p:nvCxnSpPr>
+          <p:cNvPr id="47" name="Straight Arrow Connector 46"/>
+          <p:cNvCxnSpPr>
+            <a:stCxn id="48" idx="3"/>
+            <a:endCxn id="46" idx="1"/>
+          </p:cNvCxnSpPr>
+          <p:nvPr/>
+        </p:nvCxnSpPr>
+        <p:spPr>
+          <a:xfrm>
+            <a:off x="2624360" y="3003033"/>
+            <a:ext cx="200920" cy="10557"/>
+          </a:xfrm>
+          <a:prstGeom prst="straightConnector1">
+            <a:avLst/>
+          </a:prstGeom>
+          <a:ln w="19050">
+            <a:solidFill>
+              <a:srgbClr val="7030A0"/>
+            </a:solidFill>
+            <a:headEnd type="none" w="med" len="med"/>
+            <a:tailEnd type="arrow" w="med" len="med"/>
+          </a:ln>
+          <a:effectLst/>
+        </p:spPr>
+        <p:style>
+          <a:lnRef idx="1">
+            <a:schemeClr val="accent2"/>
+          </a:lnRef>
+          <a:fillRef idx="2">
+            <a:schemeClr val="accent2"/>
+          </a:fillRef>
+          <a:effectRef idx="1">
+            <a:schemeClr val="accent2"/>
+          </a:effectRef>
+          <a:fontRef idx="minor">
+            <a:schemeClr val="dk1"/>
+          </a:fontRef>
+        </p:style>
+      </p:cxnSp>
+      <p:sp>
+        <p:nvSpPr>
+          <p:cNvPr id="48" name="Flowchart: Decision 96"/>
+          <p:cNvSpPr/>
+          <p:nvPr/>
+        </p:nvSpPr>
+        <p:spPr>
+          <a:xfrm>
+            <a:off x="2388312" y="2916343"/>
+            <a:ext cx="236048" cy="173380"/>
+          </a:xfrm>
+          <a:prstGeom prst="flowChartDecision">
+            <a:avLst/>
+          </a:prstGeom>
+          <a:noFill/>
+          <a:ln w="19050">
+            <a:solidFill>
+              <a:srgbClr val="7030A0"/>
+            </a:solidFill>
+          </a:ln>
+          <a:effectLst/>
+        </p:spPr>
+        <p:style>
+          <a:lnRef idx="1">
+            <a:schemeClr val="accent6"/>
+          </a:lnRef>
+          <a:fillRef idx="2">
+            <a:schemeClr val="accent6"/>
+          </a:fillRef>
+          <a:effectRef idx="1">
+            <a:schemeClr val="accent6"/>
+          </a:effectRef>
+          <a:fontRef idx="minor">
+            <a:schemeClr val="dk1"/>
+          </a:fontRef>
+        </p:style>
+        <p:txBody>
+          <a:bodyPr rtlCol="0" anchor="ctr"/>
+          <a:lstStyle/>
+          <a:p>
+            <a:pPr algn="ctr"/>
+            <a:endParaRPr lang="en-US" sz="1050"/>
+          </a:p>
+        </p:txBody>
+      </p:sp>
+      <p:sp>
+        <p:nvSpPr>
+          <p:cNvPr id="49" name="Rectangle 8"/>
+          <p:cNvSpPr/>
+          <p:nvPr/>
+        </p:nvSpPr>
+        <p:spPr>
+          <a:xfrm>
+            <a:off x="4692650" y="2846162"/>
+            <a:ext cx="1156969" cy="346760"/>
+          </a:xfrm>
+          <a:prstGeom prst="rect">
+            <a:avLst/>
+          </a:prstGeom>
+          <a:ln w="19050">
+            <a:solidFill>
+              <a:srgbClr val="7030A0"/>
+            </a:solidFill>
+          </a:ln>
+          <a:effectLst/>
+        </p:spPr>
+        <p:style>
+          <a:lnRef idx="1">
+            <a:schemeClr val="accent4"/>
+          </a:lnRef>
+          <a:fillRef idx="2">
+            <a:schemeClr val="accent4"/>
+          </a:fillRef>
+          <a:effectRef idx="1">
+            <a:schemeClr val="accent4"/>
+          </a:effectRef>
+          <a:fontRef idx="minor">
+            <a:schemeClr val="dk1"/>
+          </a:fontRef>
+        </p:style>
+        <p:txBody>
+          <a:bodyPr rtlCol="0" anchor="ctr"/>
+          <a:lstStyle/>
+          <a:p>
+            <a:pPr algn="ctr"/>
+            <a:r>
+              <a:rPr lang="en-US" sz="1050" dirty="0" err="1">
+                <a:solidFill>
+                  <a:srgbClr val="7030A0"/>
+                </a:solidFill>
+              </a:rPr>
+              <a:t>UniquePersonList</a:t>
+            </a:r>
+            <a:endParaRPr lang="en-SG" sz="1050" dirty="0">
+              <a:solidFill>
+                <a:srgbClr val="7030A0"/>
+              </a:solidFill>
+            </a:endParaRPr>
+          </a:p>
+        </p:txBody>
+      </p:sp>
+      <p:sp>
+        <p:nvSpPr>
+          <p:cNvPr id="51" name="Flowchart: Decision 96"/>
+          <p:cNvSpPr/>
+          <p:nvPr/>
+        </p:nvSpPr>
+        <p:spPr>
+          <a:xfrm>
+            <a:off x="4324972" y="2920532"/>
+            <a:ext cx="236048" cy="173380"/>
+          </a:xfrm>
+          <a:prstGeom prst="flowChartDecision">
+            <a:avLst/>
+          </a:prstGeom>
+          <a:solidFill>
+            <a:srgbClr val="7030A0"/>
+          </a:solidFill>
+          <a:ln w="19050">
+            <a:solidFill>
+              <a:srgbClr val="7030A0"/>
+            </a:solidFill>
+          </a:ln>
+          <a:effectLst/>
+        </p:spPr>
+        <p:style>
+          <a:lnRef idx="1">
+            <a:schemeClr val="accent6"/>
+          </a:lnRef>
+          <a:fillRef idx="2">
+            <a:schemeClr val="accent6"/>
+          </a:fillRef>
+          <a:effectRef idx="1">
+            <a:schemeClr val="accent6"/>
+          </a:effectRef>
+          <a:fontRef idx="minor">
+            <a:schemeClr val="dk1"/>
+          </a:fontRef>
+        </p:style>
+        <p:txBody>
+          <a:bodyPr rtlCol="0" anchor="ctr"/>
+          <a:lstStyle/>
+          <a:p>
+            <a:pPr algn="ctr"/>
+            <a:endParaRPr lang="en-US" sz="1050"/>
+          </a:p>
+        </p:txBody>
+      </p:sp>
+      <p:sp>
+        <p:nvSpPr>
+          <p:cNvPr id="62" name="Rectangle 8"/>
+          <p:cNvSpPr/>
+          <p:nvPr/>
+        </p:nvSpPr>
+        <p:spPr>
+          <a:xfrm>
+            <a:off x="6313677" y="2858066"/>
+            <a:ext cx="708186" cy="346760"/>
+          </a:xfrm>
+          <a:prstGeom prst="rect">
+            <a:avLst/>
+          </a:prstGeom>
+          <a:ln w="19050">
+            <a:solidFill>
+              <a:srgbClr val="7030A0"/>
+            </a:solidFill>
+          </a:ln>
+          <a:effectLst/>
+        </p:spPr>
+        <p:style>
+          <a:lnRef idx="1">
+            <a:schemeClr val="accent4"/>
+          </a:lnRef>
+          <a:fillRef idx="2">
+            <a:schemeClr val="accent4"/>
+          </a:fillRef>
+          <a:effectRef idx="1">
+            <a:schemeClr val="accent4"/>
+          </a:effectRef>
+          <a:fontRef idx="minor">
+            <a:schemeClr val="dk1"/>
+          </a:fontRef>
+        </p:style>
+        <p:txBody>
+          <a:bodyPr rtlCol="0" anchor="ctr"/>
+          <a:lstStyle/>
+          <a:p>
+            <a:pPr algn="ctr"/>
+            <a:r>
+              <a:rPr lang="en-US" sz="1050" dirty="0">
+                <a:solidFill>
+                  <a:srgbClr val="7030A0"/>
+                </a:solidFill>
+              </a:rPr>
+              <a:t>Person</a:t>
+            </a:r>
+            <a:endParaRPr lang="en-SG" sz="1050" dirty="0">
+              <a:solidFill>
+                <a:srgbClr val="7030A0"/>
+              </a:solidFill>
+            </a:endParaRPr>
+          </a:p>
+        </p:txBody>
+      </p:sp>
+      <p:sp>
+        <p:nvSpPr>
+          <p:cNvPr id="63" name="Flowchart: Decision 96"/>
+          <p:cNvSpPr/>
+          <p:nvPr/>
+        </p:nvSpPr>
+        <p:spPr>
+          <a:xfrm>
+            <a:off x="5858751" y="2941676"/>
+            <a:ext cx="236048" cy="173380"/>
+          </a:xfrm>
+          <a:prstGeom prst="flowChartDecision">
+            <a:avLst/>
+          </a:prstGeom>
+          <a:noFill/>
+          <a:ln w="19050">
+            <a:solidFill>
+              <a:srgbClr val="7030A0"/>
+            </a:solidFill>
+          </a:ln>
+          <a:effectLst/>
+        </p:spPr>
+        <p:style>
+          <a:lnRef idx="1">
+            <a:schemeClr val="accent6"/>
+          </a:lnRef>
+          <a:fillRef idx="2">
+            <a:schemeClr val="accent6"/>
+          </a:fillRef>
+          <a:effectRef idx="1">
+            <a:schemeClr val="accent6"/>
+          </a:effectRef>
+          <a:fontRef idx="minor">
+            <a:schemeClr val="dk1"/>
+          </a:fontRef>
+        </p:style>
+        <p:txBody>
+          <a:bodyPr rtlCol="0" anchor="ctr"/>
+          <a:lstStyle/>
+          <a:p>
+            <a:pPr algn="ctr"/>
+            <a:endParaRPr lang="en-US" sz="1050"/>
+          </a:p>
+        </p:txBody>
+      </p:sp>
+      <p:cxnSp>
+        <p:nvCxnSpPr>
+          <p:cNvPr id="64" name="Elbow Connector 63"/>
+          <p:cNvCxnSpPr>
+            <a:stCxn id="63" idx="3"/>
+            <a:endCxn id="62" idx="1"/>
+          </p:cNvCxnSpPr>
+          <p:nvPr/>
+        </p:nvCxnSpPr>
+        <p:spPr>
+          <a:xfrm>
+            <a:off x="6094799" y="3028366"/>
+            <a:ext cx="218878" cy="3080"/>
+          </a:xfrm>
+          <a:prstGeom prst="bentConnector3">
+            <a:avLst/>
+          </a:prstGeom>
+          <a:ln w="19050">
+            <a:solidFill>
+              <a:srgbClr val="7030A0"/>
+            </a:solidFill>
+            <a:headEnd type="none" w="med" len="med"/>
+            <a:tailEnd type="arrow" w="med" len="med"/>
+          </a:ln>
+          <a:effectLst/>
+        </p:spPr>
+        <p:style>
+          <a:lnRef idx="1">
+            <a:schemeClr val="accent2"/>
+          </a:lnRef>
+          <a:fillRef idx="2">
+            <a:schemeClr val="accent2"/>
+          </a:fillRef>
+          <a:effectRef idx="1">
+            <a:schemeClr val="accent2"/>
+          </a:effectRef>
+          <a:fontRef idx="minor">
+            <a:schemeClr val="dk1"/>
+          </a:fontRef>
+        </p:style>
+      </p:cxnSp>
+      <p:sp>
+        <p:nvSpPr>
+          <p:cNvPr id="76" name="Rectangle 8"/>
+          <p:cNvSpPr/>
+          <p:nvPr/>
+        </p:nvSpPr>
+        <p:spPr>
+          <a:xfrm>
+            <a:off x="7712397" y="2564238"/>
+            <a:ext cx="708186" cy="285783"/>
+          </a:xfrm>
+          <a:prstGeom prst="rect">
+            <a:avLst/>
+          </a:prstGeom>
+          <a:ln w="19050">
+            <a:solidFill>
+              <a:srgbClr val="7030A0"/>
+            </a:solidFill>
+          </a:ln>
+          <a:effectLst/>
+        </p:spPr>
+        <p:style>
+          <a:lnRef idx="1">
+            <a:schemeClr val="accent4"/>
+          </a:lnRef>
+          <a:fillRef idx="2">
+            <a:schemeClr val="accent4"/>
+          </a:fillRef>
+          <a:effectRef idx="1">
+            <a:schemeClr val="accent4"/>
+          </a:effectRef>
+          <a:fontRef idx="minor">
+            <a:schemeClr val="dk1"/>
+          </a:fontRef>
+        </p:style>
+        <p:txBody>
+          <a:bodyPr rtlCol="0" anchor="ctr"/>
+          <a:lstStyle/>
+          <a:p>
+            <a:pPr algn="ctr"/>
+            <a:r>
+              <a:rPr lang="en-US" sz="1050" dirty="0">
+                <a:solidFill>
+                  <a:srgbClr val="7030A0"/>
+                </a:solidFill>
+              </a:rPr>
+              <a:t>Name</a:t>
+            </a:r>
+            <a:endParaRPr lang="en-SG" sz="1050" dirty="0">
+              <a:solidFill>
+                <a:srgbClr val="7030A0"/>
+              </a:solidFill>
+            </a:endParaRPr>
+          </a:p>
+        </p:txBody>
+      </p:sp>
+      <p:sp>
+        <p:nvSpPr>
+          <p:cNvPr id="78" name="Flowchart: Decision 96"/>
+          <p:cNvSpPr/>
+          <p:nvPr/>
+        </p:nvSpPr>
+        <p:spPr>
+          <a:xfrm>
+            <a:off x="7041947" y="2948201"/>
+            <a:ext cx="236048" cy="173380"/>
+          </a:xfrm>
+          <a:prstGeom prst="flowChartDecision">
+            <a:avLst/>
+          </a:prstGeom>
+          <a:solidFill>
+            <a:srgbClr val="7030A0"/>
+          </a:solidFill>
+          <a:ln w="19050">
+            <a:solidFill>
+              <a:srgbClr val="7030A0"/>
+            </a:solidFill>
+          </a:ln>
+          <a:effectLst/>
+        </p:spPr>
+        <p:style>
+          <a:lnRef idx="1">
+            <a:schemeClr val="accent6"/>
+          </a:lnRef>
+          <a:fillRef idx="2">
+            <a:schemeClr val="accent6"/>
+          </a:fillRef>
+          <a:effectRef idx="1">
+            <a:schemeClr val="accent6"/>
+          </a:effectRef>
+          <a:fontRef idx="minor">
+            <a:schemeClr val="dk1"/>
+          </a:fontRef>
+        </p:style>
+        <p:txBody>
+          <a:bodyPr rtlCol="0" anchor="ctr"/>
+          <a:lstStyle/>
+          <a:p>
+            <a:pPr algn="ctr"/>
+            <a:endParaRPr lang="en-US" sz="1050"/>
+          </a:p>
+        </p:txBody>
+      </p:sp>
+      <p:cxnSp>
+        <p:nvCxnSpPr>
+          <p:cNvPr id="79" name="Elbow Connector 78"/>
+          <p:cNvCxnSpPr>
+            <a:cxnSpLocks/>
+          </p:cNvCxnSpPr>
+          <p:nvPr/>
+        </p:nvCxnSpPr>
+        <p:spPr>
+          <a:xfrm flipV="1">
+            <a:off x="7277995" y="2706821"/>
+            <a:ext cx="434402" cy="327761"/>
+          </a:xfrm>
+          <a:prstGeom prst="bentConnector3">
+            <a:avLst/>
+          </a:prstGeom>
+          <a:ln w="19050">
+            <a:solidFill>
+              <a:srgbClr val="7030A0"/>
+            </a:solidFill>
+            <a:headEnd type="none" w="med" len="med"/>
+            <a:tailEnd type="arrow" w="med" len="med"/>
+          </a:ln>
+          <a:effectLst/>
+        </p:spPr>
+        <p:style>
+          <a:lnRef idx="1">
+            <a:schemeClr val="accent2"/>
+          </a:lnRef>
+          <a:fillRef idx="2">
+            <a:schemeClr val="accent2"/>
+          </a:fillRef>
+          <a:effectRef idx="1">
+            <a:schemeClr val="accent2"/>
+          </a:effectRef>
+          <a:fontRef idx="minor">
+            <a:schemeClr val="dk1"/>
+          </a:fontRef>
+        </p:style>
+      </p:cxnSp>
+      <p:sp>
+        <p:nvSpPr>
+          <p:cNvPr id="80" name="Rectangle 8"/>
+          <p:cNvSpPr/>
+          <p:nvPr/>
+        </p:nvSpPr>
+        <p:spPr>
+          <a:xfrm>
+            <a:off x="7712397" y="2887216"/>
+            <a:ext cx="708186" cy="285783"/>
+          </a:xfrm>
+          <a:prstGeom prst="rect">
+            <a:avLst/>
+          </a:prstGeom>
+          <a:ln w="19050">
+            <a:solidFill>
+              <a:srgbClr val="7030A0"/>
+            </a:solidFill>
+          </a:ln>
+          <a:effectLst/>
+        </p:spPr>
+        <p:style>
+          <a:lnRef idx="1">
+            <a:schemeClr val="accent4"/>
+          </a:lnRef>
+          <a:fillRef idx="2">
+            <a:schemeClr val="accent4"/>
+          </a:fillRef>
+          <a:effectRef idx="1">
+            <a:schemeClr val="accent4"/>
+          </a:effectRef>
+          <a:fontRef idx="minor">
+            <a:schemeClr val="dk1"/>
+          </a:fontRef>
+        </p:style>
+        <p:txBody>
+          <a:bodyPr rtlCol="0" anchor="ctr"/>
+          <a:lstStyle/>
+          <a:p>
+            <a:pPr algn="ctr"/>
+            <a:r>
+              <a:rPr lang="en-US" sz="1050" dirty="0">
+                <a:solidFill>
+                  <a:srgbClr val="7030A0"/>
+                </a:solidFill>
+              </a:rPr>
+              <a:t>Phone</a:t>
+            </a:r>
+            <a:endParaRPr lang="en-SG" sz="1050" dirty="0">
+              <a:solidFill>
+                <a:srgbClr val="7030A0"/>
+              </a:solidFill>
+            </a:endParaRPr>
+          </a:p>
+        </p:txBody>
+      </p:sp>
+      <p:cxnSp>
+        <p:nvCxnSpPr>
+          <p:cNvPr id="81" name="Elbow Connector 80"/>
+          <p:cNvCxnSpPr>
+            <a:stCxn id="78" idx="3"/>
+            <a:endCxn id="80" idx="1"/>
+          </p:cNvCxnSpPr>
+          <p:nvPr/>
+        </p:nvCxnSpPr>
+        <p:spPr>
+          <a:xfrm flipV="1">
+            <a:off x="7277995" y="3030108"/>
+            <a:ext cx="434402" cy="4783"/>
+          </a:xfrm>
+          <a:prstGeom prst="bentConnector3">
+            <a:avLst/>
+          </a:prstGeom>
+          <a:ln w="19050">
+            <a:solidFill>
+              <a:srgbClr val="7030A0"/>
+            </a:solidFill>
+            <a:headEnd type="none" w="med" len="med"/>
+            <a:tailEnd type="arrow" w="med" len="med"/>
+          </a:ln>
+          <a:effectLst/>
+        </p:spPr>
+        <p:style>
+          <a:lnRef idx="1">
+            <a:schemeClr val="accent2"/>
+          </a:lnRef>
+          <a:fillRef idx="2">
+            <a:schemeClr val="accent2"/>
+          </a:fillRef>
+          <a:effectRef idx="1">
+            <a:schemeClr val="accent2"/>
+          </a:effectRef>
+          <a:fontRef idx="minor">
+            <a:schemeClr val="dk1"/>
+          </a:fontRef>
+        </p:style>
+      </p:cxnSp>
+      <p:sp>
+        <p:nvSpPr>
+          <p:cNvPr id="83" name="Rectangle 8"/>
+          <p:cNvSpPr/>
+          <p:nvPr/>
+        </p:nvSpPr>
+        <p:spPr>
+          <a:xfrm>
+            <a:off x="7712397" y="3210194"/>
+            <a:ext cx="708186" cy="285783"/>
+          </a:xfrm>
+          <a:prstGeom prst="rect">
+            <a:avLst/>
+          </a:prstGeom>
+          <a:ln w="19050">
+            <a:solidFill>
+              <a:srgbClr val="7030A0"/>
+            </a:solidFill>
+          </a:ln>
+          <a:effectLst/>
+        </p:spPr>
+        <p:style>
+          <a:lnRef idx="1">
+            <a:schemeClr val="accent4"/>
+          </a:lnRef>
+          <a:fillRef idx="2">
+            <a:schemeClr val="accent4"/>
+          </a:fillRef>
+          <a:effectRef idx="1">
+            <a:schemeClr val="accent4"/>
+          </a:effectRef>
+          <a:fontRef idx="minor">
+            <a:schemeClr val="dk1"/>
+          </a:fontRef>
+        </p:style>
+        <p:txBody>
+          <a:bodyPr rtlCol="0" anchor="ctr"/>
+          <a:lstStyle/>
+          <a:p>
+            <a:pPr algn="ctr"/>
+            <a:r>
+              <a:rPr lang="en-US" sz="1050" dirty="0">
+                <a:solidFill>
+                  <a:srgbClr val="7030A0"/>
+                </a:solidFill>
+              </a:rPr>
+              <a:t>Email</a:t>
+            </a:r>
+            <a:endParaRPr lang="en-SG" sz="1050" dirty="0">
+              <a:solidFill>
+                <a:srgbClr val="7030A0"/>
+              </a:solidFill>
+            </a:endParaRPr>
+          </a:p>
+        </p:txBody>
+      </p:sp>
+      <p:cxnSp>
+        <p:nvCxnSpPr>
+          <p:cNvPr id="84" name="Elbow Connector 83"/>
+          <p:cNvCxnSpPr>
+            <a:stCxn id="78" idx="3"/>
+            <a:endCxn id="83" idx="1"/>
+          </p:cNvCxnSpPr>
+          <p:nvPr/>
+        </p:nvCxnSpPr>
+        <p:spPr>
+          <a:xfrm>
+            <a:off x="7277995" y="3034891"/>
+            <a:ext cx="434402" cy="318195"/>
+          </a:xfrm>
+          <a:prstGeom prst="bentConnector3">
+            <a:avLst/>
+          </a:prstGeom>
+          <a:ln w="19050">
+            <a:solidFill>
+              <a:srgbClr val="7030A0"/>
+            </a:solidFill>
+            <a:headEnd type="none" w="med" len="med"/>
+            <a:tailEnd type="arrow" w="med" len="med"/>
+          </a:ln>
+          <a:effectLst/>
+        </p:spPr>
+        <p:style>
+          <a:lnRef idx="1">
+            <a:schemeClr val="accent2"/>
+          </a:lnRef>
+          <a:fillRef idx="2">
+            <a:schemeClr val="accent2"/>
+          </a:fillRef>
+          <a:effectRef idx="1">
+            <a:schemeClr val="accent2"/>
+          </a:effectRef>
+          <a:fontRef idx="minor">
+            <a:schemeClr val="dk1"/>
+          </a:fontRef>
+        </p:style>
+      </p:cxnSp>
+      <p:sp>
+        <p:nvSpPr>
+          <p:cNvPr id="85" name="Rectangle 8"/>
+          <p:cNvSpPr/>
+          <p:nvPr/>
+        </p:nvSpPr>
+        <p:spPr>
+          <a:xfrm>
+            <a:off x="7712397" y="3533171"/>
+            <a:ext cx="708186" cy="285783"/>
+          </a:xfrm>
+          <a:prstGeom prst="rect">
+            <a:avLst/>
+          </a:prstGeom>
+          <a:ln w="19050">
+            <a:solidFill>
+              <a:srgbClr val="7030A0"/>
+            </a:solidFill>
+          </a:ln>
+          <a:effectLst/>
+        </p:spPr>
+        <p:style>
+          <a:lnRef idx="1">
+            <a:schemeClr val="accent4"/>
+          </a:lnRef>
+          <a:fillRef idx="2">
+            <a:schemeClr val="accent4"/>
+          </a:fillRef>
+          <a:effectRef idx="1">
+            <a:schemeClr val="accent4"/>
+          </a:effectRef>
+          <a:fontRef idx="minor">
+            <a:schemeClr val="dk1"/>
+          </a:fontRef>
+        </p:style>
+        <p:txBody>
+          <a:bodyPr rtlCol="0" anchor="ctr"/>
+          <a:lstStyle/>
+          <a:p>
+            <a:pPr algn="ctr"/>
+            <a:r>
+              <a:rPr lang="en-US" sz="1050" dirty="0">
+                <a:solidFill>
+                  <a:srgbClr val="7030A0"/>
+                </a:solidFill>
+              </a:rPr>
+              <a:t>Address</a:t>
+            </a:r>
+            <a:endParaRPr lang="en-SG" sz="1050" dirty="0">
+              <a:solidFill>
+                <a:srgbClr val="7030A0"/>
+              </a:solidFill>
+            </a:endParaRPr>
+          </a:p>
+        </p:txBody>
+      </p:sp>
+      <p:cxnSp>
+        <p:nvCxnSpPr>
+          <p:cNvPr id="86" name="Elbow Connector 85"/>
+          <p:cNvCxnSpPr>
+            <a:stCxn id="78" idx="3"/>
+            <a:endCxn id="85" idx="1"/>
+          </p:cNvCxnSpPr>
+          <p:nvPr/>
+        </p:nvCxnSpPr>
+        <p:spPr>
+          <a:xfrm>
+            <a:off x="7277995" y="3034891"/>
+            <a:ext cx="434402" cy="641172"/>
+          </a:xfrm>
+          <a:prstGeom prst="bentConnector3">
+            <a:avLst/>
+          </a:prstGeom>
+          <a:ln w="19050">
+            <a:solidFill>
+              <a:srgbClr val="7030A0"/>
+            </a:solidFill>
+            <a:headEnd type="none" w="med" len="med"/>
+            <a:tailEnd type="arrow" w="med" len="med"/>
+          </a:ln>
+          <a:effectLst/>
+        </p:spPr>
+        <p:style>
+          <a:lnRef idx="1">
+            <a:schemeClr val="accent2"/>
+          </a:lnRef>
+          <a:fillRef idx="2">
+            <a:schemeClr val="accent2"/>
+          </a:fillRef>
+          <a:effectRef idx="1">
+            <a:schemeClr val="accent2"/>
+          </a:effectRef>
+          <a:fontRef idx="minor">
+            <a:schemeClr val="dk1"/>
+          </a:fontRef>
+        </p:style>
+      </p:cxnSp>
+      <p:cxnSp>
+        <p:nvCxnSpPr>
+          <p:cNvPr id="97" name="Elbow Connector 63"/>
+          <p:cNvCxnSpPr>
+            <a:stCxn id="99" idx="3"/>
+          </p:cNvCxnSpPr>
+          <p:nvPr/>
+        </p:nvCxnSpPr>
+        <p:spPr>
+          <a:xfrm rot="5400000">
+            <a:off x="3553611" y="2687559"/>
+            <a:ext cx="293825" cy="5938"/>
+          </a:xfrm>
+          <a:prstGeom prst="bentConnector3">
+            <a:avLst>
+              <a:gd name="adj1" fmla="val 50000"/>
+            </a:avLst>
+          </a:prstGeom>
+          <a:ln w="19050">
+            <a:solidFill>
+              <a:srgbClr val="7030A0"/>
+            </a:solidFill>
+            <a:prstDash val="sysDot"/>
+            <a:headEnd type="none" w="med" len="med"/>
+            <a:tailEnd type="none" w="med" len="med"/>
+          </a:ln>
+          <a:effectLst/>
+        </p:spPr>
+        <p:style>
+          <a:lnRef idx="1">
+            <a:schemeClr val="accent2"/>
+          </a:lnRef>
+          <a:fillRef idx="2">
+            <a:schemeClr val="accent2"/>
+          </a:fillRef>
+          <a:effectRef idx="1">
+            <a:schemeClr val="accent2"/>
+          </a:effectRef>
+          <a:fontRef idx="minor">
+            <a:schemeClr val="dk1"/>
+          </a:fontRef>
+        </p:style>
+      </p:cxnSp>
+      <p:sp>
+        <p:nvSpPr>
+          <p:cNvPr id="99" name="Isosceles Triangle 102"/>
+          <p:cNvSpPr/>
+          <p:nvPr/>
+        </p:nvSpPr>
+        <p:spPr>
+          <a:xfrm rot="10800000" flipV="1">
+            <a:off x="3562299" y="2386554"/>
+            <a:ext cx="282387" cy="157062"/>
+          </a:xfrm>
+          <a:prstGeom prst="triangle">
+            <a:avLst/>
+          </a:prstGeom>
+          <a:ln w="19050">
+            <a:solidFill>
+              <a:srgbClr val="7030A0"/>
+            </a:solidFill>
+          </a:ln>
+          <a:effectLst/>
+        </p:spPr>
+        <p:style>
+          <a:lnRef idx="1">
+            <a:schemeClr val="accent4"/>
+          </a:lnRef>
+          <a:fillRef idx="2">
+            <a:schemeClr val="accent4"/>
+          </a:fillRef>
+          <a:effectRef idx="1">
+            <a:schemeClr val="accent4"/>
+          </a:effectRef>
+          <a:fontRef idx="minor">
+            <a:schemeClr val="dk1"/>
+          </a:fontRef>
+        </p:style>
+        <p:txBody>
+          <a:bodyPr rtlCol="0" anchor="ctr"/>
+          <a:lstStyle/>
+          <a:p>
+            <a:pPr algn="ctr"/>
+            <a:endParaRPr lang="en-SG" sz="1050" b="1">
+              <a:solidFill>
+                <a:srgbClr val="92D050"/>
+              </a:solidFill>
+            </a:endParaRPr>
+          </a:p>
+        </p:txBody>
+      </p:sp>
+      <p:sp>
+        <p:nvSpPr>
+          <p:cNvPr id="100" name="Rectangle 8"/>
+          <p:cNvSpPr/>
+          <p:nvPr/>
+        </p:nvSpPr>
+        <p:spPr>
+          <a:xfrm>
+            <a:off x="1260922" y="1998350"/>
+            <a:ext cx="1443661" cy="364396"/>
+          </a:xfrm>
+          <a:prstGeom prst="rect">
+            <a:avLst/>
+          </a:prstGeom>
+          <a:ln w="19050">
+            <a:solidFill>
+              <a:srgbClr val="7030A0"/>
+            </a:solidFill>
+          </a:ln>
+          <a:effectLst/>
+        </p:spPr>
+        <p:style>
+          <a:lnRef idx="1">
+            <a:schemeClr val="accent4"/>
+          </a:lnRef>
+          <a:fillRef idx="2">
+            <a:schemeClr val="accent4"/>
+          </a:fillRef>
+          <a:effectRef idx="1">
+            <a:schemeClr val="accent4"/>
+          </a:effectRef>
+          <a:fontRef idx="minor">
+            <a:schemeClr val="dk1"/>
+          </a:fontRef>
+        </p:style>
+        <p:txBody>
+          <a:bodyPr rtlCol="0" anchor="ctr"/>
+          <a:lstStyle/>
+          <a:p>
+            <a:pPr algn="ctr"/>
+            <a:r>
+              <a:rPr lang="en-US" sz="1050" dirty="0">
+                <a:solidFill>
+                  <a:srgbClr val="7030A0"/>
+                </a:solidFill>
+              </a:rPr>
+              <a:t>&lt;&lt;interface&gt;&gt;</a:t>
+            </a:r>
+            <a:br>
+              <a:rPr lang="en-US" sz="1050" dirty="0">
+                <a:solidFill>
+                  <a:srgbClr val="7030A0"/>
+                </a:solidFill>
+              </a:rPr>
+            </a:br>
+            <a:r>
+              <a:rPr lang="en-US" sz="1050" dirty="0" err="1">
+                <a:solidFill>
+                  <a:srgbClr val="7030A0"/>
+                </a:solidFill>
+              </a:rPr>
+              <a:t>ReadOnlyAddressBook</a:t>
+            </a:r>
+            <a:endParaRPr lang="en-SG" sz="1050" dirty="0">
+              <a:solidFill>
+                <a:srgbClr val="7030A0"/>
+              </a:solidFill>
+            </a:endParaRPr>
+          </a:p>
+        </p:txBody>
+      </p:sp>
+      <p:sp>
+        <p:nvSpPr>
+          <p:cNvPr id="114" name="TextBox 113"/>
+          <p:cNvSpPr txBox="1"/>
+          <p:nvPr/>
+        </p:nvSpPr>
+        <p:spPr>
+          <a:xfrm>
+            <a:off x="5801325" y="3353085"/>
+            <a:ext cx="881018" cy="261610"/>
+          </a:xfrm>
+          <a:prstGeom prst="rect">
+            <a:avLst/>
+          </a:prstGeom>
+          <a:noFill/>
+        </p:spPr>
+        <p:txBody>
+          <a:bodyPr wrap="square" rtlCol="0">
+            <a:spAutoFit/>
+          </a:bodyPr>
+          <a:lstStyle/>
+          <a:p>
+            <a:pPr algn="r"/>
+            <a:r>
+              <a:rPr lang="en-US" sz="1100" dirty="0">
+                <a:solidFill>
+                  <a:srgbClr val="7030A0"/>
+                </a:solidFill>
+              </a:rPr>
+              <a:t>filtered list</a:t>
+            </a:r>
+            <a:endParaRPr lang="en-SG" sz="1100" dirty="0">
+              <a:solidFill>
+                <a:srgbClr val="7030A0"/>
+              </a:solidFill>
+            </a:endParaRPr>
+          </a:p>
+        </p:txBody>
+      </p:sp>
+      <p:sp>
+        <p:nvSpPr>
+          <p:cNvPr id="122" name="Rectangle 8"/>
+          <p:cNvSpPr/>
+          <p:nvPr/>
+        </p:nvSpPr>
+        <p:spPr>
+          <a:xfrm>
+            <a:off x="2057401" y="4239491"/>
+            <a:ext cx="1066800" cy="346760"/>
+          </a:xfrm>
+          <a:prstGeom prst="rect">
+            <a:avLst/>
+          </a:prstGeom>
+          <a:ln w="19050">
+            <a:solidFill>
+              <a:srgbClr val="7030A0"/>
+            </a:solidFill>
+          </a:ln>
+          <a:effectLst/>
+        </p:spPr>
+        <p:style>
+          <a:lnRef idx="1">
+            <a:schemeClr val="accent4"/>
+          </a:lnRef>
+          <a:fillRef idx="2">
+            <a:schemeClr val="accent4"/>
+          </a:fillRef>
+          <a:effectRef idx="1">
+            <a:schemeClr val="accent4"/>
+          </a:effectRef>
+          <a:fontRef idx="minor">
+            <a:schemeClr val="dk1"/>
+          </a:fontRef>
+        </p:style>
+        <p:txBody>
+          <a:bodyPr rtlCol="0" anchor="ctr"/>
+          <a:lstStyle/>
+          <a:p>
+            <a:pPr algn="ctr"/>
+            <a:r>
+              <a:rPr lang="en-US" sz="1050" dirty="0">
+                <a:solidFill>
+                  <a:srgbClr val="7030A0"/>
+                </a:solidFill>
+              </a:rPr>
+              <a:t>&lt;&lt;interface&gt;&gt;</a:t>
+            </a:r>
+            <a:br>
+              <a:rPr lang="en-US" sz="1050">
+                <a:solidFill>
+                  <a:srgbClr val="7030A0"/>
+                </a:solidFill>
+              </a:rPr>
+            </a:br>
+            <a:r>
+              <a:rPr lang="en-US" sz="1050" dirty="0" err="1">
+                <a:solidFill>
+                  <a:srgbClr val="7030A0"/>
+                </a:solidFill>
+              </a:rPr>
+              <a:t>ObservableList</a:t>
+            </a:r>
+            <a:endParaRPr lang="en-SG" sz="1050" dirty="0">
+              <a:solidFill>
+                <a:srgbClr val="7030A0"/>
+              </a:solidFill>
+            </a:endParaRPr>
+          </a:p>
+        </p:txBody>
+      </p:sp>
+      <p:cxnSp>
+        <p:nvCxnSpPr>
+          <p:cNvPr id="124" name="Elbow Connector 122"/>
+          <p:cNvCxnSpPr>
+            <a:stCxn id="119" idx="1"/>
+            <a:endCxn id="122" idx="1"/>
+          </p:cNvCxnSpPr>
+          <p:nvPr/>
+        </p:nvCxnSpPr>
+        <p:spPr>
+          <a:xfrm rot="16200000" flipH="1">
+            <a:off x="1364475" y="3719944"/>
+            <a:ext cx="831471" cy="554381"/>
+          </a:xfrm>
+          <a:prstGeom prst="bentConnector2">
+            <a:avLst/>
+          </a:prstGeom>
+          <a:ln w="19050">
+            <a:solidFill>
+              <a:srgbClr val="7030A0"/>
+            </a:solidFill>
+            <a:prstDash val="sysDot"/>
+            <a:headEnd type="none" w="med" len="med"/>
+            <a:tailEnd type="arrow" w="med" len="med"/>
+          </a:ln>
+          <a:effectLst/>
+        </p:spPr>
+        <p:style>
+          <a:lnRef idx="1">
+            <a:schemeClr val="accent2"/>
+          </a:lnRef>
+          <a:fillRef idx="2">
+            <a:schemeClr val="accent2"/>
+          </a:fillRef>
+          <a:effectRef idx="1">
+            <a:schemeClr val="accent2"/>
+          </a:effectRef>
+          <a:fontRef idx="minor">
+            <a:schemeClr val="dk1"/>
+          </a:fontRef>
+        </p:style>
+      </p:cxnSp>
+      <p:sp>
+        <p:nvSpPr>
+          <p:cNvPr id="54" name="TextBox 53"/>
+          <p:cNvSpPr txBox="1"/>
+          <p:nvPr/>
+        </p:nvSpPr>
+        <p:spPr>
+          <a:xfrm>
+            <a:off x="4429979" y="3111479"/>
+            <a:ext cx="189257" cy="178683"/>
+          </a:xfrm>
+          <a:prstGeom prst="rect">
+            <a:avLst/>
+          </a:prstGeom>
+          <a:noFill/>
+        </p:spPr>
+        <p:txBody>
+          <a:bodyPr wrap="square" lIns="0" tIns="0" rIns="0" bIns="0" rtlCol="0">
+            <a:noAutofit/>
+          </a:bodyPr>
+          <a:lstStyle/>
+          <a:p>
+            <a:pPr algn="ctr"/>
+            <a:r>
+              <a:rPr lang="en-US" sz="1100" dirty="0">
+                <a:solidFill>
+                  <a:srgbClr val="7030A0"/>
+                </a:solidFill>
+              </a:rPr>
+              <a:t>1</a:t>
+            </a:r>
+            <a:endParaRPr lang="en-SG" sz="1100" dirty="0">
+              <a:solidFill>
+                <a:srgbClr val="7030A0"/>
+              </a:solidFill>
+            </a:endParaRPr>
+          </a:p>
+        </p:txBody>
+      </p:sp>
+      <p:sp>
+        <p:nvSpPr>
+          <p:cNvPr id="61" name="TextBox 60"/>
+          <p:cNvSpPr txBox="1"/>
+          <p:nvPr/>
+        </p:nvSpPr>
+        <p:spPr>
+          <a:xfrm>
+            <a:off x="6135256" y="3097917"/>
+            <a:ext cx="189257" cy="178683"/>
+          </a:xfrm>
+          <a:prstGeom prst="rect">
+            <a:avLst/>
+          </a:prstGeom>
+          <a:noFill/>
+        </p:spPr>
+        <p:txBody>
+          <a:bodyPr wrap="square" lIns="0" tIns="0" rIns="0" bIns="0" rtlCol="0">
+            <a:noAutofit/>
+          </a:bodyPr>
+          <a:lstStyle/>
+          <a:p>
+            <a:pPr algn="ctr"/>
+            <a:r>
+              <a:rPr lang="en-US" sz="1100" dirty="0">
+                <a:solidFill>
+                  <a:srgbClr val="7030A0"/>
+                </a:solidFill>
+              </a:rPr>
+              <a:t>*</a:t>
+            </a:r>
+            <a:endParaRPr lang="en-SG" sz="1100" dirty="0">
+              <a:solidFill>
+                <a:srgbClr val="7030A0"/>
+              </a:solidFill>
+            </a:endParaRPr>
+          </a:p>
+        </p:txBody>
+      </p:sp>
+      <p:sp>
+        <p:nvSpPr>
+          <p:cNvPr id="65" name="TextBox 64"/>
+          <p:cNvSpPr txBox="1"/>
+          <p:nvPr/>
+        </p:nvSpPr>
+        <p:spPr>
+          <a:xfrm>
+            <a:off x="2573394" y="2756715"/>
+            <a:ext cx="170110" cy="137542"/>
+          </a:xfrm>
+          <a:prstGeom prst="rect">
+            <a:avLst/>
+          </a:prstGeom>
+          <a:noFill/>
+        </p:spPr>
+        <p:txBody>
+          <a:bodyPr wrap="square" lIns="0" tIns="0" rIns="0" bIns="0" rtlCol="0">
+            <a:noAutofit/>
+          </a:bodyPr>
+          <a:lstStyle/>
+          <a:p>
+            <a:pPr algn="ctr"/>
+            <a:r>
+              <a:rPr lang="en-US" sz="1100" dirty="0">
+                <a:solidFill>
+                  <a:srgbClr val="7030A0"/>
+                </a:solidFill>
+              </a:rPr>
+              <a:t>1</a:t>
+            </a:r>
+            <a:endParaRPr lang="en-SG" sz="1100" dirty="0">
+              <a:solidFill>
+                <a:srgbClr val="7030A0"/>
+              </a:solidFill>
+            </a:endParaRPr>
+          </a:p>
+        </p:txBody>
+      </p:sp>
+      <p:sp>
+        <p:nvSpPr>
+          <p:cNvPr id="66" name="TextBox 65"/>
+          <p:cNvSpPr txBox="1"/>
+          <p:nvPr/>
+        </p:nvSpPr>
+        <p:spPr>
+          <a:xfrm>
+            <a:off x="2707070" y="3667737"/>
+            <a:ext cx="189257" cy="178683"/>
+          </a:xfrm>
+          <a:prstGeom prst="rect">
+            <a:avLst/>
+          </a:prstGeom>
+          <a:noFill/>
+        </p:spPr>
+        <p:txBody>
+          <a:bodyPr wrap="square" lIns="0" tIns="0" rIns="0" bIns="0" rtlCol="0">
+            <a:noAutofit/>
+          </a:bodyPr>
+          <a:lstStyle/>
+          <a:p>
+            <a:pPr algn="ctr"/>
+            <a:r>
+              <a:rPr lang="en-US" sz="1100" dirty="0">
+                <a:solidFill>
+                  <a:srgbClr val="7030A0"/>
+                </a:solidFill>
+              </a:rPr>
+              <a:t>1</a:t>
+            </a:r>
+            <a:endParaRPr lang="en-SG" sz="1100" dirty="0">
+              <a:solidFill>
+                <a:srgbClr val="7030A0"/>
+              </a:solidFill>
+            </a:endParaRPr>
+          </a:p>
+        </p:txBody>
+      </p:sp>
+      <p:sp>
+        <p:nvSpPr>
+          <p:cNvPr id="70" name="TextBox 69"/>
+          <p:cNvSpPr txBox="1"/>
+          <p:nvPr/>
+        </p:nvSpPr>
+        <p:spPr>
+          <a:xfrm>
+            <a:off x="6449896" y="3204826"/>
+            <a:ext cx="189257" cy="178683"/>
+          </a:xfrm>
+          <a:prstGeom prst="rect">
+            <a:avLst/>
+          </a:prstGeom>
+          <a:noFill/>
+        </p:spPr>
+        <p:txBody>
+          <a:bodyPr wrap="square" lIns="0" tIns="0" rIns="0" bIns="0" rtlCol="0">
+            <a:noAutofit/>
+          </a:bodyPr>
+          <a:lstStyle/>
+          <a:p>
+            <a:pPr algn="ctr"/>
+            <a:r>
+              <a:rPr lang="en-US" sz="1100" dirty="0">
+                <a:solidFill>
+                  <a:srgbClr val="7030A0"/>
+                </a:solidFill>
+              </a:rPr>
+              <a:t>1</a:t>
+            </a:r>
+            <a:endParaRPr lang="en-SG" sz="1100" dirty="0">
+              <a:solidFill>
+                <a:srgbClr val="7030A0"/>
+              </a:solidFill>
+            </a:endParaRPr>
+          </a:p>
+        </p:txBody>
+      </p:sp>
+      <p:sp>
+        <p:nvSpPr>
+          <p:cNvPr id="52" name="Rectangle 8">
+            <a:extLst>
+              <a:ext uri="{FF2B5EF4-FFF2-40B4-BE49-F238E27FC236}">
+                <a16:creationId xmlns:a16="http://schemas.microsoft.com/office/drawing/2014/main" id="{ABDCDBD2-131A-4B66-A2F2-43BBEE82C773}"/>
+              </a:ext>
+            </a:extLst>
+          </p:cNvPr>
+          <p:cNvSpPr/>
+          <p:nvPr/>
+        </p:nvSpPr>
+        <p:spPr>
+          <a:xfrm>
+            <a:off x="7712397" y="2228817"/>
+            <a:ext cx="708186" cy="285783"/>
+          </a:xfrm>
+          <a:prstGeom prst="rect">
+            <a:avLst/>
+          </a:prstGeom>
+          <a:ln w="19050">
+            <a:solidFill>
+              <a:srgbClr val="7030A0"/>
+            </a:solidFill>
+          </a:ln>
+          <a:effectLst/>
+        </p:spPr>
+        <p:style>
+          <a:lnRef idx="1">
+            <a:schemeClr val="accent4"/>
+          </a:lnRef>
+          <a:fillRef idx="2">
+            <a:schemeClr val="accent4"/>
+          </a:fillRef>
+          <a:effectRef idx="1">
+            <a:schemeClr val="accent4"/>
+          </a:effectRef>
+          <a:fontRef idx="minor">
+            <a:schemeClr val="dk1"/>
+          </a:fontRef>
+        </p:style>
+        <p:txBody>
+          <a:bodyPr rtlCol="0" anchor="ctr"/>
+          <a:lstStyle/>
+          <a:p>
+            <a:pPr algn="ctr"/>
+            <a:r>
+              <a:rPr lang="en-US" sz="1050" dirty="0">
+                <a:solidFill>
+                  <a:srgbClr val="7030A0"/>
+                </a:solidFill>
+              </a:rPr>
+              <a:t>Tag</a:t>
+            </a:r>
+            <a:endParaRPr lang="en-SG" sz="1050" dirty="0">
+              <a:solidFill>
+                <a:srgbClr val="7030A0"/>
+              </a:solidFill>
+            </a:endParaRPr>
+          </a:p>
+        </p:txBody>
+      </p:sp>
+      <p:cxnSp>
+        <p:nvCxnSpPr>
+          <p:cNvPr id="53" name="Elbow Connector 78">
+            <a:extLst>
+              <a:ext uri="{FF2B5EF4-FFF2-40B4-BE49-F238E27FC236}">
+                <a16:creationId xmlns:a16="http://schemas.microsoft.com/office/drawing/2014/main" id="{B97967F8-618A-448B-81FD-CDFD4AF0EC64}"/>
+              </a:ext>
+            </a:extLst>
+          </p:cNvPr>
+          <p:cNvCxnSpPr>
+            <a:cxnSpLocks/>
+            <a:stCxn id="78" idx="3"/>
+            <a:endCxn id="52" idx="1"/>
+          </p:cNvCxnSpPr>
+          <p:nvPr/>
+        </p:nvCxnSpPr>
+        <p:spPr>
+          <a:xfrm flipV="1">
+            <a:off x="7277995" y="2371709"/>
+            <a:ext cx="434402" cy="663182"/>
+          </a:xfrm>
+          <a:prstGeom prst="bentConnector3">
+            <a:avLst>
+              <a:gd name="adj1" fmla="val 50000"/>
+            </a:avLst>
+          </a:prstGeom>
+          <a:ln w="19050">
+            <a:solidFill>
+              <a:srgbClr val="7030A0"/>
+            </a:solidFill>
+            <a:headEnd type="none" w="med" len="med"/>
+            <a:tailEnd type="arrow" w="med" len="med"/>
+          </a:ln>
+          <a:effectLst/>
+        </p:spPr>
+        <p:style>
+          <a:lnRef idx="1">
+            <a:schemeClr val="accent2"/>
+          </a:lnRef>
+          <a:fillRef idx="2">
+            <a:schemeClr val="accent2"/>
+          </a:fillRef>
+          <a:effectRef idx="1">
+            <a:schemeClr val="accent2"/>
+          </a:effectRef>
+          <a:fontRef idx="minor">
+            <a:schemeClr val="dk1"/>
+          </a:fontRef>
+        </p:style>
+      </p:cxnSp>
+      <p:sp>
+        <p:nvSpPr>
+          <p:cNvPr id="50" name="TextBox 49">
+            <a:extLst>
+              <a:ext uri="{FF2B5EF4-FFF2-40B4-BE49-F238E27FC236}">
+                <a16:creationId xmlns:a16="http://schemas.microsoft.com/office/drawing/2014/main" id="{B3FA9D57-880F-49C4-AD0B-A64E30D6F403}"/>
+              </a:ext>
+            </a:extLst>
+          </p:cNvPr>
+          <p:cNvSpPr txBox="1"/>
+          <p:nvPr/>
+        </p:nvSpPr>
+        <p:spPr>
+          <a:xfrm>
+            <a:off x="7466243" y="2255711"/>
+            <a:ext cx="189257" cy="178683"/>
+          </a:xfrm>
+          <a:prstGeom prst="rect">
+            <a:avLst/>
+          </a:prstGeom>
+          <a:noFill/>
+        </p:spPr>
+        <p:txBody>
+          <a:bodyPr wrap="square" lIns="0" tIns="0" rIns="0" bIns="0" rtlCol="0">
+            <a:noAutofit/>
+          </a:bodyPr>
+          <a:lstStyle/>
+          <a:p>
+            <a:pPr algn="ctr"/>
+            <a:r>
+              <a:rPr lang="en-US" sz="1100" dirty="0">
+                <a:solidFill>
+                  <a:srgbClr val="7030A0"/>
+                </a:solidFill>
+              </a:rPr>
+              <a:t>*</a:t>
+            </a:r>
+            <a:endParaRPr lang="en-SG" sz="1100" dirty="0">
+              <a:solidFill>
+                <a:srgbClr val="7030A0"/>
+              </a:solidFill>
+            </a:endParaRPr>
+          </a:p>
+        </p:txBody>
+      </p:sp>
+      <p:sp>
+        <p:nvSpPr>
+          <p:cNvPr id="55" name="Rectangle 8"/>
+          <p:cNvSpPr/>
+          <p:nvPr/>
+        </p:nvSpPr>
+        <p:spPr>
+          <a:xfrm>
+            <a:off x="3170181" y="1998350"/>
+            <a:ext cx="1060683" cy="364396"/>
+          </a:xfrm>
+          <a:prstGeom prst="rect">
+            <a:avLst/>
+          </a:prstGeom>
+          <a:ln w="19050">
+            <a:solidFill>
+              <a:srgbClr val="7030A0"/>
+            </a:solidFill>
+          </a:ln>
+          <a:effectLst/>
+        </p:spPr>
+        <p:style>
+          <a:lnRef idx="1">
+            <a:schemeClr val="accent4"/>
+          </a:lnRef>
+          <a:fillRef idx="2">
+            <a:schemeClr val="accent4"/>
+          </a:fillRef>
+          <a:effectRef idx="1">
+            <a:schemeClr val="accent4"/>
+          </a:effectRef>
+          <a:fontRef idx="minor">
+            <a:schemeClr val="dk1"/>
+          </a:fontRef>
+        </p:style>
+        <p:txBody>
+          <a:bodyPr rtlCol="0" anchor="ctr"/>
+          <a:lstStyle/>
+          <a:p>
+            <a:pPr algn="ctr"/>
+            <a:r>
+              <a:rPr lang="en-US" sz="1050" dirty="0" err="1">
+                <a:solidFill>
+                  <a:srgbClr val="7030A0"/>
+                </a:solidFill>
+              </a:rPr>
+              <a:t>AddressBook</a:t>
+            </a:r>
+            <a:endParaRPr lang="en-SG" sz="1050" dirty="0">
+              <a:solidFill>
+                <a:srgbClr val="7030A0"/>
+              </a:solidFill>
+            </a:endParaRPr>
+          </a:p>
+        </p:txBody>
+      </p:sp>
+      <p:cxnSp>
+        <p:nvCxnSpPr>
+          <p:cNvPr id="60" name="Straight Arrow Connector 59"/>
+          <p:cNvCxnSpPr>
+            <a:stCxn id="51" idx="1"/>
+            <a:endCxn id="49" idx="1"/>
+          </p:cNvCxnSpPr>
+          <p:nvPr/>
+        </p:nvCxnSpPr>
+        <p:spPr>
+          <a:xfrm>
+            <a:off x="4324972" y="3007222"/>
+            <a:ext cx="367678" cy="12320"/>
+          </a:xfrm>
+          <a:prstGeom prst="straightConnector1">
+            <a:avLst/>
+          </a:prstGeom>
+          <a:ln w="19050">
+            <a:solidFill>
+              <a:srgbClr val="7030A0"/>
+            </a:solidFill>
+            <a:headEnd type="none" w="med" len="med"/>
+            <a:tailEnd type="arrow" w="med" len="med"/>
+          </a:ln>
+          <a:effectLst/>
+        </p:spPr>
+        <p:style>
+          <a:lnRef idx="1">
+            <a:schemeClr val="accent2"/>
+          </a:lnRef>
+          <a:fillRef idx="2">
+            <a:schemeClr val="accent2"/>
+          </a:fillRef>
+          <a:effectRef idx="1">
+            <a:schemeClr val="accent2"/>
+          </a:effectRef>
+          <a:fontRef idx="minor">
+            <a:schemeClr val="dk1"/>
+          </a:fontRef>
+        </p:style>
+      </p:cxnSp>
+      <p:sp>
+        <p:nvSpPr>
+          <p:cNvPr id="68" name="Isosceles Triangle 102"/>
+          <p:cNvSpPr/>
+          <p:nvPr/>
+        </p:nvSpPr>
+        <p:spPr>
+          <a:xfrm rot="16200000">
+            <a:off x="2669073" y="2069158"/>
+            <a:ext cx="271014" cy="187417"/>
+          </a:xfrm>
+          <a:prstGeom prst="triangle">
+            <a:avLst>
+              <a:gd name="adj" fmla="val 44517"/>
+            </a:avLst>
+          </a:prstGeom>
+          <a:solidFill>
+            <a:schemeClr val="accent4">
+              <a:lumMod val="20000"/>
+              <a:lumOff val="80000"/>
+            </a:schemeClr>
+          </a:solidFill>
+          <a:ln w="19050">
+            <a:solidFill>
+              <a:srgbClr val="7030A0"/>
+            </a:solidFill>
+          </a:ln>
+          <a:effectLst/>
+        </p:spPr>
+        <p:style>
+          <a:lnRef idx="1">
+            <a:schemeClr val="accent6"/>
+          </a:lnRef>
+          <a:fillRef idx="2">
+            <a:schemeClr val="accent6"/>
+          </a:fillRef>
+          <a:effectRef idx="1">
+            <a:schemeClr val="accent6"/>
+          </a:effectRef>
+          <a:fontRef idx="minor">
+            <a:schemeClr val="dk1"/>
+          </a:fontRef>
+        </p:style>
+        <p:txBody>
+          <a:bodyPr rtlCol="0" anchor="ctr"/>
+          <a:lstStyle/>
+          <a:p>
+            <a:pPr algn="ctr"/>
+            <a:endParaRPr lang="en-SG" sz="1050"/>
+          </a:p>
+        </p:txBody>
+      </p:sp>
+      <p:cxnSp>
+        <p:nvCxnSpPr>
+          <p:cNvPr id="69" name="Elbow Connector 63"/>
+          <p:cNvCxnSpPr>
+            <a:stCxn id="68" idx="3"/>
+            <a:endCxn id="55" idx="1"/>
+          </p:cNvCxnSpPr>
+          <p:nvPr/>
+        </p:nvCxnSpPr>
+        <p:spPr>
+          <a:xfrm>
+            <a:off x="2898289" y="2177727"/>
+            <a:ext cx="271892" cy="2821"/>
+          </a:xfrm>
+          <a:prstGeom prst="bentConnector3">
+            <a:avLst>
+              <a:gd name="adj1" fmla="val 50000"/>
+            </a:avLst>
+          </a:prstGeom>
+          <a:ln w="19050">
+            <a:solidFill>
+              <a:srgbClr val="7030A0"/>
+            </a:solidFill>
+            <a:prstDash val="sysDot"/>
+            <a:headEnd type="none" w="med" len="med"/>
+            <a:tailEnd type="none" w="med" len="med"/>
+          </a:ln>
+          <a:effectLst/>
+        </p:spPr>
+        <p:style>
+          <a:lnRef idx="1">
+            <a:schemeClr val="accent2"/>
+          </a:lnRef>
+          <a:fillRef idx="2">
+            <a:schemeClr val="accent2"/>
+          </a:fillRef>
+          <a:effectRef idx="1">
+            <a:schemeClr val="accent2"/>
+          </a:effectRef>
+          <a:fontRef idx="minor">
+            <a:schemeClr val="dk1"/>
+          </a:fontRef>
+        </p:style>
+      </p:cxnSp>
+      <p:cxnSp>
+        <p:nvCxnSpPr>
+          <p:cNvPr id="4" name="Connector: Elbow 3">
+            <a:extLst>
+              <a:ext uri="{FF2B5EF4-FFF2-40B4-BE49-F238E27FC236}">
+                <a16:creationId xmlns:a16="http://schemas.microsoft.com/office/drawing/2014/main" id="{C8B78A4B-E24B-4724-B806-E3D75FD94407}"/>
+              </a:ext>
+            </a:extLst>
+          </p:cNvPr>
+          <p:cNvCxnSpPr>
+            <a:cxnSpLocks/>
+            <a:endCxn id="62" idx="2"/>
+          </p:cNvCxnSpPr>
+          <p:nvPr/>
+        </p:nvCxnSpPr>
+        <p:spPr>
+          <a:xfrm flipV="1">
+            <a:off x="2388312" y="3204826"/>
+            <a:ext cx="4279458" cy="189934"/>
+          </a:xfrm>
+          <a:prstGeom prst="bentConnector2">
+            <a:avLst/>
+          </a:prstGeom>
+          <a:ln w="19050">
+            <a:solidFill>
+              <a:srgbClr val="7030A0"/>
+            </a:solidFill>
+            <a:headEnd type="none" w="med" len="med"/>
+            <a:tailEnd type="arrow" w="med" len="med"/>
+          </a:ln>
+          <a:effectLst/>
+        </p:spPr>
+        <p:style>
+          <a:lnRef idx="1">
+            <a:schemeClr val="accent2"/>
+          </a:lnRef>
+          <a:fillRef idx="2">
+            <a:schemeClr val="accent2"/>
+          </a:fillRef>
+          <a:effectRef idx="1">
+            <a:schemeClr val="accent2"/>
+          </a:effectRef>
+          <a:fontRef idx="minor">
+            <a:schemeClr val="dk1"/>
+          </a:fontRef>
+        </p:style>
+      </p:cxnSp>
+      <p:cxnSp>
+        <p:nvCxnSpPr>
+          <p:cNvPr id="8" name="Connector: Elbow 7">
+            <a:extLst>
+              <a:ext uri="{FF2B5EF4-FFF2-40B4-BE49-F238E27FC236}">
+                <a16:creationId xmlns:a16="http://schemas.microsoft.com/office/drawing/2014/main" id="{E0E8398C-845E-4D45-AF12-6DFB5669B374}"/>
+              </a:ext>
+            </a:extLst>
+          </p:cNvPr>
+          <p:cNvCxnSpPr>
+            <a:cxnSpLocks/>
+            <a:stCxn id="9" idx="1"/>
+          </p:cNvCxnSpPr>
+          <p:nvPr/>
+        </p:nvCxnSpPr>
+        <p:spPr>
+          <a:xfrm rot="16200000" flipH="1">
+            <a:off x="3198683" y="2827631"/>
+            <a:ext cx="126840" cy="2107474"/>
+          </a:xfrm>
+          <a:prstGeom prst="bentConnector2">
+            <a:avLst/>
+          </a:prstGeom>
+          <a:ln w="19050">
+            <a:solidFill>
+              <a:srgbClr val="7030A0"/>
+            </a:solidFill>
+            <a:headEnd type="none" w="med" len="med"/>
+            <a:tailEnd type="arrow" w="med" len="med"/>
+          </a:ln>
+          <a:effectLst/>
+        </p:spPr>
+        <p:style>
+          <a:lnRef idx="1">
+            <a:schemeClr val="accent2"/>
+          </a:lnRef>
+          <a:fillRef idx="2">
+            <a:schemeClr val="accent2"/>
+          </a:fillRef>
+          <a:effectRef idx="1">
+            <a:schemeClr val="accent2"/>
+          </a:effectRef>
+          <a:fontRef idx="minor">
+            <a:schemeClr val="dk1"/>
+          </a:fontRef>
+        </p:style>
+      </p:cxnSp>
+      <p:sp>
+        <p:nvSpPr>
+          <p:cNvPr id="56" name="Rectangle 8">
+            <a:extLst>
+              <a:ext uri="{FF2B5EF4-FFF2-40B4-BE49-F238E27FC236}">
+                <a16:creationId xmlns:a16="http://schemas.microsoft.com/office/drawing/2014/main" id="{71A372DE-74C8-4C75-BAF7-705E6257A1A6}"/>
+              </a:ext>
+            </a:extLst>
+          </p:cNvPr>
+          <p:cNvSpPr/>
+          <p:nvPr/>
+        </p:nvSpPr>
+        <p:spPr>
+          <a:xfrm>
+            <a:off x="4337627" y="3761095"/>
+            <a:ext cx="1626779" cy="334856"/>
+          </a:xfrm>
+          <a:prstGeom prst="rect">
+            <a:avLst/>
+          </a:prstGeom>
+          <a:ln w="19050">
+            <a:solidFill>
+              <a:srgbClr val="7030A0"/>
+            </a:solidFill>
+          </a:ln>
+          <a:effectLst/>
+        </p:spPr>
+        <p:style>
+          <a:lnRef idx="1">
+            <a:schemeClr val="accent4"/>
+          </a:lnRef>
+          <a:fillRef idx="2">
+            <a:schemeClr val="accent4"/>
+          </a:fillRef>
+          <a:effectRef idx="1">
+            <a:schemeClr val="accent4"/>
+          </a:effectRef>
+          <a:fontRef idx="minor">
+            <a:schemeClr val="dk1"/>
+          </a:fontRef>
+        </p:style>
+        <p:txBody>
+          <a:bodyPr rtlCol="0" anchor="ctr"/>
+          <a:lstStyle/>
+          <a:p>
+            <a:pPr algn="ctr"/>
+            <a:r>
+              <a:rPr lang="en-US" sz="1050" dirty="0" err="1">
+                <a:solidFill>
+                  <a:srgbClr val="7030A0"/>
+                </a:solidFill>
+              </a:rPr>
+              <a:t>IntuitivePromptManager</a:t>
+            </a:r>
+            <a:endParaRPr lang="en-SG" sz="1050" dirty="0">
+              <a:solidFill>
+                <a:srgbClr val="7030A0"/>
+              </a:solidFill>
+            </a:endParaRPr>
+          </a:p>
+        </p:txBody>
+      </p:sp>
+      <p:sp>
+        <p:nvSpPr>
+          <p:cNvPr id="57" name="TextBox 56">
+            <a:extLst>
+              <a:ext uri="{FF2B5EF4-FFF2-40B4-BE49-F238E27FC236}">
+                <a16:creationId xmlns:a16="http://schemas.microsoft.com/office/drawing/2014/main" id="{44FF10F4-0C39-461D-AA25-ABCB9DA4D464}"/>
+              </a:ext>
+            </a:extLst>
+          </p:cNvPr>
+          <p:cNvSpPr txBox="1"/>
+          <p:nvPr/>
+        </p:nvSpPr>
+        <p:spPr>
+          <a:xfrm>
+            <a:off x="4148370" y="3990642"/>
+            <a:ext cx="189257" cy="178683"/>
+          </a:xfrm>
+          <a:prstGeom prst="rect">
+            <a:avLst/>
+          </a:prstGeom>
+          <a:noFill/>
+        </p:spPr>
+        <p:txBody>
+          <a:bodyPr wrap="square" lIns="0" tIns="0" rIns="0" bIns="0" rtlCol="0">
+            <a:noAutofit/>
+          </a:bodyPr>
+          <a:lstStyle/>
+          <a:p>
+            <a:pPr algn="ctr"/>
+            <a:r>
+              <a:rPr lang="en-US" sz="1100" dirty="0">
+                <a:solidFill>
+                  <a:srgbClr val="7030A0"/>
+                </a:solidFill>
+              </a:rPr>
+              <a:t>1</a:t>
+            </a:r>
+            <a:endParaRPr lang="en-SG" sz="1100" dirty="0">
+              <a:solidFill>
+                <a:srgbClr val="7030A0"/>
+              </a:solidFill>
+            </a:endParaRPr>
+          </a:p>
+        </p:txBody>
+      </p:sp>
+      <p:cxnSp>
+        <p:nvCxnSpPr>
+          <p:cNvPr id="12" name="Straight Arrow Connector 11">
+            <a:extLst>
+              <a:ext uri="{FF2B5EF4-FFF2-40B4-BE49-F238E27FC236}">
+                <a16:creationId xmlns:a16="http://schemas.microsoft.com/office/drawing/2014/main" id="{2F50B11D-F93C-4415-B410-F88955E92DF5}"/>
+              </a:ext>
+            </a:extLst>
+          </p:cNvPr>
+          <p:cNvCxnSpPr>
+            <a:stCxn id="56" idx="3"/>
+          </p:cNvCxnSpPr>
+          <p:nvPr/>
+        </p:nvCxnSpPr>
+        <p:spPr>
+          <a:xfrm>
+            <a:off x="5964406" y="3928523"/>
+            <a:ext cx="485490" cy="0"/>
+          </a:xfrm>
+          <a:prstGeom prst="straightConnector1">
+            <a:avLst/>
+          </a:prstGeom>
+          <a:ln w="19050">
+            <a:solidFill>
+              <a:srgbClr val="7030A0"/>
+            </a:solidFill>
+            <a:headEnd type="none" w="med" len="med"/>
+            <a:tailEnd type="arrow" w="med" len="med"/>
+          </a:ln>
+          <a:effectLst/>
+        </p:spPr>
+        <p:style>
+          <a:lnRef idx="1">
+            <a:schemeClr val="accent2"/>
+          </a:lnRef>
+          <a:fillRef idx="2">
+            <a:schemeClr val="accent2"/>
+          </a:fillRef>
+          <a:effectRef idx="1">
+            <a:schemeClr val="accent2"/>
+          </a:effectRef>
+          <a:fontRef idx="minor">
+            <a:schemeClr val="dk1"/>
+          </a:fontRef>
+        </p:style>
+      </p:cxnSp>
+      <p:sp>
+        <p:nvSpPr>
+          <p:cNvPr id="59" name="Rectangle 8">
+            <a:extLst>
+              <a:ext uri="{FF2B5EF4-FFF2-40B4-BE49-F238E27FC236}">
+                <a16:creationId xmlns:a16="http://schemas.microsoft.com/office/drawing/2014/main" id="{441D0D01-9B77-4BAA-BFE8-5517F57D55B3}"/>
+              </a:ext>
+            </a:extLst>
+          </p:cNvPr>
+          <p:cNvSpPr/>
+          <p:nvPr/>
+        </p:nvSpPr>
+        <p:spPr>
+          <a:xfrm>
+            <a:off x="6449896" y="3653175"/>
+            <a:ext cx="789104" cy="439625"/>
+          </a:xfrm>
+          <a:prstGeom prst="rect">
+            <a:avLst/>
+          </a:prstGeom>
+          <a:ln w="19050">
+            <a:solidFill>
+              <a:srgbClr val="7030A0"/>
+            </a:solidFill>
+          </a:ln>
+          <a:effectLst/>
+        </p:spPr>
+        <p:style>
+          <a:lnRef idx="1">
+            <a:schemeClr val="accent4"/>
+          </a:lnRef>
+          <a:fillRef idx="2">
+            <a:schemeClr val="accent4"/>
+          </a:fillRef>
+          <a:effectRef idx="1">
+            <a:schemeClr val="accent4"/>
+          </a:effectRef>
+          <a:fontRef idx="minor">
+            <a:schemeClr val="dk1"/>
+          </a:fontRef>
+        </p:style>
+        <p:txBody>
+          <a:bodyPr rtlCol="0" anchor="ctr"/>
+          <a:lstStyle/>
+          <a:p>
+            <a:pPr algn="ctr"/>
+            <a:r>
+              <a:rPr lang="en-US" sz="1050" dirty="0">
+                <a:solidFill>
+                  <a:srgbClr val="7030A0"/>
+                </a:solidFill>
+              </a:rPr>
+              <a:t>{abstract}</a:t>
+            </a:r>
+          </a:p>
+          <a:p>
+            <a:pPr algn="ctr"/>
+            <a:r>
+              <a:rPr lang="en-US" sz="1050" dirty="0" err="1">
+                <a:solidFill>
+                  <a:srgbClr val="7030A0"/>
+                </a:solidFill>
+              </a:rPr>
+              <a:t>ArgumentManager</a:t>
+            </a:r>
+            <a:endParaRPr lang="en-SG" sz="1050" dirty="0">
+              <a:solidFill>
+                <a:srgbClr val="7030A0"/>
+              </a:solidFill>
+            </a:endParaRPr>
+          </a:p>
+        </p:txBody>
+      </p:sp>
+      <p:sp>
+        <p:nvSpPr>
+          <p:cNvPr id="67" name="TextBox 66">
+            <a:extLst>
+              <a:ext uri="{FF2B5EF4-FFF2-40B4-BE49-F238E27FC236}">
+                <a16:creationId xmlns:a16="http://schemas.microsoft.com/office/drawing/2014/main" id="{17262009-CFA0-491D-830F-CD23BC1B6A82}"/>
+              </a:ext>
+            </a:extLst>
+          </p:cNvPr>
+          <p:cNvSpPr txBox="1"/>
+          <p:nvPr/>
+        </p:nvSpPr>
+        <p:spPr>
+          <a:xfrm>
+            <a:off x="6204238" y="3730269"/>
+            <a:ext cx="246631" cy="178683"/>
+          </a:xfrm>
+          <a:prstGeom prst="rect">
+            <a:avLst/>
+          </a:prstGeom>
+          <a:noFill/>
+        </p:spPr>
+        <p:txBody>
+          <a:bodyPr wrap="square" lIns="0" tIns="0" rIns="0" bIns="0" rtlCol="0">
+            <a:noAutofit/>
+          </a:bodyPr>
+          <a:lstStyle/>
+          <a:p>
+            <a:pPr algn="ctr"/>
+            <a:r>
+              <a:rPr lang="en-US" sz="1100" dirty="0">
+                <a:solidFill>
+                  <a:srgbClr val="7030A0"/>
+                </a:solidFill>
+              </a:rPr>
+              <a:t>0..1</a:t>
+            </a:r>
+            <a:endParaRPr lang="en-SG" sz="1100" dirty="0">
+              <a:solidFill>
+                <a:srgbClr val="7030A0"/>
+              </a:solidFill>
+            </a:endParaRPr>
+          </a:p>
+        </p:txBody>
+      </p:sp>
+      <p:sp>
+        <p:nvSpPr>
+          <p:cNvPr id="71" name="Isosceles Triangle 102">
+            <a:extLst>
+              <a:ext uri="{FF2B5EF4-FFF2-40B4-BE49-F238E27FC236}">
+                <a16:creationId xmlns:a16="http://schemas.microsoft.com/office/drawing/2014/main" id="{72921818-6164-481E-B6CA-9F3EEFE4E26F}"/>
+              </a:ext>
+            </a:extLst>
+          </p:cNvPr>
+          <p:cNvSpPr/>
+          <p:nvPr/>
+        </p:nvSpPr>
+        <p:spPr>
+          <a:xfrm rot="10800000" flipV="1">
+            <a:off x="6703254" y="4111242"/>
+            <a:ext cx="282387" cy="157062"/>
+          </a:xfrm>
+          <a:prstGeom prst="triangle">
+            <a:avLst/>
+          </a:prstGeom>
+          <a:ln w="19050">
+            <a:solidFill>
+              <a:srgbClr val="7030A0"/>
+            </a:solidFill>
+          </a:ln>
+          <a:effectLst/>
+        </p:spPr>
+        <p:style>
+          <a:lnRef idx="1">
+            <a:schemeClr val="accent4"/>
+          </a:lnRef>
+          <a:fillRef idx="2">
+            <a:schemeClr val="accent4"/>
+          </a:fillRef>
+          <a:effectRef idx="1">
+            <a:schemeClr val="accent4"/>
+          </a:effectRef>
+          <a:fontRef idx="minor">
+            <a:schemeClr val="dk1"/>
+          </a:fontRef>
+        </p:style>
+        <p:txBody>
+          <a:bodyPr rtlCol="0" anchor="ctr"/>
+          <a:lstStyle/>
+          <a:p>
+            <a:pPr algn="ctr"/>
+            <a:endParaRPr lang="en-SG" sz="1050" b="1">
+              <a:solidFill>
+                <a:srgbClr val="92D050"/>
+              </a:solidFill>
+            </a:endParaRPr>
+          </a:p>
+        </p:txBody>
+      </p:sp>
+      <p:cxnSp>
+        <p:nvCxnSpPr>
+          <p:cNvPr id="17" name="Straight Connector 16">
+            <a:extLst>
+              <a:ext uri="{FF2B5EF4-FFF2-40B4-BE49-F238E27FC236}">
+                <a16:creationId xmlns:a16="http://schemas.microsoft.com/office/drawing/2014/main" id="{4CCE8042-75FC-4FE2-BB47-677E91AE1102}"/>
+              </a:ext>
+            </a:extLst>
+          </p:cNvPr>
+          <p:cNvCxnSpPr>
+            <a:cxnSpLocks/>
+            <a:stCxn id="71" idx="3"/>
+          </p:cNvCxnSpPr>
+          <p:nvPr/>
+        </p:nvCxnSpPr>
+        <p:spPr>
+          <a:xfrm>
+            <a:off x="6844447" y="4268304"/>
+            <a:ext cx="0" cy="317947"/>
+          </a:xfrm>
+          <a:prstGeom prst="line">
+            <a:avLst/>
+          </a:prstGeom>
+        </p:spPr>
+        <p:style>
+          <a:lnRef idx="1">
+            <a:schemeClr val="accent1"/>
+          </a:lnRef>
+          <a:fillRef idx="0">
+            <a:schemeClr val="accent1"/>
+          </a:fillRef>
+          <a:effectRef idx="0">
+            <a:schemeClr val="accent1"/>
+          </a:effectRef>
+          <a:fontRef idx="minor">
+            <a:schemeClr val="tx1"/>
+          </a:fontRef>
+        </p:style>
+      </p:cxnSp>
+      <p:sp>
+        <p:nvSpPr>
+          <p:cNvPr id="72" name="Rectangle 8">
+            <a:extLst>
+              <a:ext uri="{FF2B5EF4-FFF2-40B4-BE49-F238E27FC236}">
+                <a16:creationId xmlns:a16="http://schemas.microsoft.com/office/drawing/2014/main" id="{AB9D5D30-DCDA-4C87-8C2F-39FD9CE2284E}"/>
+              </a:ext>
+            </a:extLst>
+          </p:cNvPr>
+          <p:cNvSpPr/>
+          <p:nvPr/>
+        </p:nvSpPr>
+        <p:spPr>
+          <a:xfrm>
+            <a:off x="6355540" y="4575102"/>
+            <a:ext cx="941503" cy="439625"/>
+          </a:xfrm>
+          <a:prstGeom prst="rect">
+            <a:avLst/>
+          </a:prstGeom>
+          <a:ln w="19050">
+            <a:solidFill>
+              <a:srgbClr val="7030A0"/>
+            </a:solidFill>
+          </a:ln>
+          <a:effectLst/>
+        </p:spPr>
+        <p:style>
+          <a:lnRef idx="1">
+            <a:schemeClr val="accent4"/>
+          </a:lnRef>
+          <a:fillRef idx="2">
+            <a:schemeClr val="accent4"/>
+          </a:fillRef>
+          <a:effectRef idx="1">
+            <a:schemeClr val="accent4"/>
+          </a:effectRef>
+          <a:fontRef idx="minor">
+            <a:schemeClr val="dk1"/>
+          </a:fontRef>
+        </p:style>
+        <p:txBody>
+          <a:bodyPr rtlCol="0" anchor="ctr"/>
+          <a:lstStyle/>
+          <a:p>
+            <a:pPr algn="ctr"/>
+            <a:r>
+              <a:rPr lang="en-US" sz="1050" dirty="0" err="1">
+                <a:solidFill>
+                  <a:srgbClr val="7030A0"/>
+                </a:solidFill>
+              </a:rPr>
+              <a:t>XYZArgumentManager</a:t>
+            </a:r>
+            <a:endParaRPr lang="en-SG" sz="1050" dirty="0">
+              <a:solidFill>
+                <a:srgbClr val="7030A0"/>
+              </a:solidFill>
+            </a:endParaRPr>
+          </a:p>
+        </p:txBody>
+      </p:sp>
+      <p:sp>
+        <p:nvSpPr>
+          <p:cNvPr id="73" name="Folded Corner 126">
+            <a:extLst>
+              <a:ext uri="{FF2B5EF4-FFF2-40B4-BE49-F238E27FC236}">
+                <a16:creationId xmlns:a16="http://schemas.microsoft.com/office/drawing/2014/main" id="{C04257BB-DDB0-45A3-97E6-48F440D14215}"/>
+              </a:ext>
+            </a:extLst>
+          </p:cNvPr>
+          <p:cNvSpPr/>
+          <p:nvPr/>
+        </p:nvSpPr>
+        <p:spPr>
+          <a:xfrm>
+            <a:off x="4509332" y="4369886"/>
+            <a:ext cx="1605231" cy="811714"/>
+          </a:xfrm>
+          <a:prstGeom prst="foldedCorner">
+            <a:avLst/>
+          </a:prstGeom>
+          <a:ln w="19050">
+            <a:solidFill>
+              <a:srgbClr val="7030A0"/>
+            </a:solidFill>
+          </a:ln>
+          <a:effectLst/>
+        </p:spPr>
+        <p:style>
+          <a:lnRef idx="1">
+            <a:schemeClr val="accent4"/>
+          </a:lnRef>
+          <a:fillRef idx="2">
+            <a:schemeClr val="accent4"/>
+          </a:fillRef>
+          <a:effectRef idx="1">
+            <a:schemeClr val="accent4"/>
+          </a:effectRef>
+          <a:fontRef idx="minor">
+            <a:schemeClr val="dk1"/>
+          </a:fontRef>
+        </p:style>
+        <p:txBody>
+          <a:bodyPr rtlCol="0" anchor="ctr"/>
+          <a:lstStyle/>
+          <a:p>
+            <a:pPr algn="ctr"/>
+            <a:r>
+              <a:rPr lang="en-US" sz="1050" dirty="0" err="1">
+                <a:solidFill>
+                  <a:srgbClr val="7030A0"/>
+                </a:solidFill>
+              </a:rPr>
+              <a:t>XYZArgumentManager</a:t>
+            </a:r>
+            <a:r>
+              <a:rPr lang="en-US" sz="1050" dirty="0">
+                <a:solidFill>
+                  <a:srgbClr val="7030A0"/>
+                </a:solidFill>
+              </a:rPr>
+              <a:t> = </a:t>
+            </a:r>
+            <a:r>
+              <a:rPr lang="en-US" sz="1050" dirty="0" err="1">
+                <a:solidFill>
+                  <a:srgbClr val="7030A0"/>
+                </a:solidFill>
+              </a:rPr>
+              <a:t>AddArgumentManager</a:t>
+            </a:r>
+            <a:r>
+              <a:rPr lang="en-US" sz="1050" dirty="0">
+                <a:solidFill>
+                  <a:srgbClr val="7030A0"/>
+                </a:solidFill>
+              </a:rPr>
+              <a:t>, </a:t>
+            </a:r>
+            <a:r>
+              <a:rPr lang="en-US" sz="1050" dirty="0" err="1">
+                <a:solidFill>
+                  <a:srgbClr val="7030A0"/>
+                </a:solidFill>
+              </a:rPr>
+              <a:t>FindArgumentManager</a:t>
+            </a:r>
+            <a:r>
+              <a:rPr lang="en-US" sz="1050" dirty="0">
+                <a:solidFill>
+                  <a:srgbClr val="7030A0"/>
+                </a:solidFill>
+              </a:rPr>
+              <a:t>, etc.</a:t>
+            </a:r>
+          </a:p>
+        </p:txBody>
+      </p:sp>
+    </p:spTree>
+    <p:extLst>
+      <p:ext uri="{BB962C8B-B14F-4D97-AF65-F5344CB8AC3E}">
+        <p14:creationId xmlns:p14="http://schemas.microsoft.com/office/powerpoint/2010/main" val="1956354987"/>
       </p:ext>
     </p:extLst>
   </p:cSld>

</xml_diff>